<commit_message>
added final questions slide
</commit_message>
<xml_diff>
--- a/WWCBelfast_NOV2014/WWC Belfast NOV 2014 - Introduction to Git.pptx
+++ b/WWCBelfast_NOV2014/WWC Belfast NOV 2014 - Introduction to Git.pptx
@@ -18,7 +18,7 @@
     <p:sldMasterId id="2147483661" r:id="rId17"/>
   </p:sldMasterIdLst>
   <p:notesMasterIdLst>
-    <p:notesMasterId r:id="rId25"/>
+    <p:notesMasterId r:id="rId26"/>
   </p:notesMasterIdLst>
   <p:sldIdLst>
     <p:sldId id="256" r:id="rId18"/>
@@ -28,6 +28,7 @@
     <p:sldId id="310" r:id="rId22"/>
     <p:sldId id="312" r:id="rId23"/>
     <p:sldId id="311" r:id="rId24"/>
+    <p:sldId id="315" r:id="rId25"/>
   </p:sldIdLst>
   <p:sldSz cx="24384000" cy="13716000"/>
   <p:notesSz cx="6858000" cy="9144000"/>
@@ -167,7 +168,7 @@
   </p:defaultTextStyle>
   <p:extLst>
     <p:ext uri="{EFAFB233-063F-42B5-8137-9DF3F51BA10A}">
-      <p15:sldGuideLst xmlns:p15="http://schemas.microsoft.com/office/powerpoint/2012/main">
+      <p15:sldGuideLst xmlns:p15="http://schemas.microsoft.com/office/powerpoint/2012/main" xmlns="">
         <p15:guide id="1" orient="horz" pos="4320">
           <p15:clr>
             <a:srgbClr val="A4A3A4"/>
@@ -267,7 +268,7 @@
             <a:fld id="{B732B711-94EA-4849-9CDF-C10517F75A29}" type="datetimeFigureOut">
               <a:rPr lang="en-GB" smtClean="0"/>
               <a:pPr/>
-              <a:t>06/11/2014</a:t>
+              <a:t>10/11/14</a:t>
             </a:fld>
             <a:endParaRPr lang="en-GB"/>
           </a:p>
@@ -1133,6 +1134,91 @@
 </p:notes>
 </file>
 
+<file path=ppt/notesSlides/notesSlide8.xml><?xml version="1.0" encoding="utf-8"?>
+<p:notes xmlns:a="http://schemas.openxmlformats.org/drawingml/2006/main" xmlns:r="http://schemas.openxmlformats.org/officeDocument/2006/relationships" xmlns:p="http://schemas.openxmlformats.org/presentationml/2006/main">
+  <p:cSld>
+    <p:spTree>
+      <p:nvGrpSpPr>
+        <p:cNvPr id="1" name=""/>
+        <p:cNvGrpSpPr/>
+        <p:nvPr/>
+      </p:nvGrpSpPr>
+      <p:grpSpPr>
+        <a:xfrm>
+          <a:off x="0" y="0"/>
+          <a:ext cx="0" cy="0"/>
+          <a:chOff x="0" y="0"/>
+          <a:chExt cx="0" cy="0"/>
+        </a:xfrm>
+      </p:grpSpPr>
+      <p:sp>
+        <p:nvSpPr>
+          <p:cNvPr id="2" name="Slide Image Placeholder 1"/>
+          <p:cNvSpPr>
+            <a:spLocks noGrp="1" noRot="1" noChangeAspect="1"/>
+          </p:cNvSpPr>
+          <p:nvPr>
+            <p:ph type="sldImg"/>
+          </p:nvPr>
+        </p:nvSpPr>
+        <p:spPr/>
+      </p:sp>
+      <p:sp>
+        <p:nvSpPr>
+          <p:cNvPr id="3" name="Notes Placeholder 2"/>
+          <p:cNvSpPr>
+            <a:spLocks noGrp="1"/>
+          </p:cNvSpPr>
+          <p:nvPr>
+            <p:ph type="body" idx="1"/>
+          </p:nvPr>
+        </p:nvSpPr>
+        <p:spPr/>
+        <p:txBody>
+          <a:bodyPr/>
+          <a:lstStyle/>
+          <a:p>
+            <a:endParaRPr lang="en-US"/>
+          </a:p>
+        </p:txBody>
+      </p:sp>
+      <p:sp>
+        <p:nvSpPr>
+          <p:cNvPr id="4" name="Slide Number Placeholder 3"/>
+          <p:cNvSpPr>
+            <a:spLocks noGrp="1"/>
+          </p:cNvSpPr>
+          <p:nvPr>
+            <p:ph type="sldNum" sz="quarter" idx="10"/>
+          </p:nvPr>
+        </p:nvSpPr>
+        <p:spPr/>
+        <p:txBody>
+          <a:bodyPr/>
+          <a:lstStyle/>
+          <a:p>
+            <a:fld id="{8A639651-2477-48DD-AF2D-E78D205C91F2}" type="slidenum">
+              <a:rPr lang="en-GB" smtClean="0"/>
+              <a:pPr/>
+              <a:t>8</a:t>
+            </a:fld>
+            <a:endParaRPr lang="en-GB"/>
+          </a:p>
+        </p:txBody>
+      </p:sp>
+    </p:spTree>
+    <p:extLst>
+      <p:ext uri="{BB962C8B-B14F-4D97-AF65-F5344CB8AC3E}">
+        <p14:creationId xmlns:p14="http://schemas.microsoft.com/office/powerpoint/2010/main" val="1720500443"/>
+      </p:ext>
+    </p:extLst>
+  </p:cSld>
+  <p:clrMapOvr>
+    <a:masterClrMapping/>
+  </p:clrMapOvr>
+</p:notes>
+</file>
+
 <file path=ppt/slideLayouts/slideLayout1.xml><?xml version="1.0" encoding="utf-8"?>
 <p:sldLayout xmlns:a="http://schemas.openxmlformats.org/drawingml/2006/main" xmlns:r="http://schemas.openxmlformats.org/officeDocument/2006/relationships" xmlns:p="http://schemas.openxmlformats.org/presentationml/2006/main" type="title" preserve="1">
   <p:cSld name="Title Slide">
@@ -1253,7 +1339,7 @@
   <p:clrMapOvr>
     <a:masterClrMapping/>
   </p:clrMapOvr>
-  <p:transition/>
+  <p:transition xmlns:p14="http://schemas.microsoft.com/office/powerpoint/2010/main"/>
 </p:sldLayout>
 </file>
 
@@ -1359,7 +1445,7 @@
   <p:clrMapOvr>
     <a:masterClrMapping/>
   </p:clrMapOvr>
-  <p:transition/>
+  <p:transition xmlns:p14="http://schemas.microsoft.com/office/powerpoint/2010/main"/>
 </p:sldLayout>
 </file>
 
@@ -1489,7 +1575,7 @@
   <p:clrMapOvr>
     <a:masterClrMapping/>
   </p:clrMapOvr>
-  <p:transition/>
+  <p:transition xmlns:p14="http://schemas.microsoft.com/office/powerpoint/2010/main"/>
 </p:sldLayout>
 </file>
 
@@ -1611,7 +1697,7 @@
   <p:clrMapOvr>
     <a:masterClrMapping/>
   </p:clrMapOvr>
-  <p:transition/>
+  <p:transition xmlns:p14="http://schemas.microsoft.com/office/powerpoint/2010/main"/>
 </p:sldLayout>
 </file>
 
@@ -1745,7 +1831,7 @@
   <p:clrMapOvr>
     <a:masterClrMapping/>
   </p:clrMapOvr>
-  <p:transition/>
+  <p:transition xmlns:p14="http://schemas.microsoft.com/office/powerpoint/2010/main"/>
 </p:sldLayout>
 </file>
 
@@ -1983,7 +2069,7 @@
   <p:clrMapOvr>
     <a:masterClrMapping/>
   </p:clrMapOvr>
-  <p:transition/>
+  <p:transition xmlns:p14="http://schemas.microsoft.com/office/powerpoint/2010/main"/>
 </p:sldLayout>
 </file>
 
@@ -2361,7 +2447,7 @@
   <p:clrMapOvr>
     <a:masterClrMapping/>
   </p:clrMapOvr>
-  <p:transition/>
+  <p:transition xmlns:p14="http://schemas.microsoft.com/office/powerpoint/2010/main"/>
 </p:sldLayout>
 </file>
 
@@ -2423,7 +2509,7 @@
   <p:clrMapOvr>
     <a:masterClrMapping/>
   </p:clrMapOvr>
-  <p:transition/>
+  <p:transition xmlns:p14="http://schemas.microsoft.com/office/powerpoint/2010/main"/>
 </p:sldLayout>
 </file>
 
@@ -2454,7 +2540,7 @@
   <p:clrMapOvr>
     <a:masterClrMapping/>
   </p:clrMapOvr>
-  <p:transition/>
+  <p:transition xmlns:p14="http://schemas.microsoft.com/office/powerpoint/2010/main"/>
 </p:sldLayout>
 </file>
 
@@ -2676,7 +2762,7 @@
   <p:clrMapOvr>
     <a:masterClrMapping/>
   </p:clrMapOvr>
-  <p:transition/>
+  <p:transition xmlns:p14="http://schemas.microsoft.com/office/powerpoint/2010/main"/>
 </p:sldLayout>
 </file>
 
@@ -2877,7 +2963,7 @@
   <p:clrMapOvr>
     <a:masterClrMapping/>
   </p:clrMapOvr>
-  <p:transition/>
+  <p:transition xmlns:p14="http://schemas.microsoft.com/office/powerpoint/2010/main"/>
 </p:sldLayout>
 </file>
 
@@ -2999,7 +3085,7 @@
   <p:clrMapOvr>
     <a:masterClrMapping/>
   </p:clrMapOvr>
-  <p:transition/>
+  <p:transition xmlns:p14="http://schemas.microsoft.com/office/powerpoint/2010/main"/>
 </p:sldLayout>
 </file>
 
@@ -3115,7 +3201,7 @@
   <p:clrMapOvr>
     <a:masterClrMapping/>
   </p:clrMapOvr>
-  <p:transition/>
+  <p:transition xmlns:p14="http://schemas.microsoft.com/office/powerpoint/2010/main"/>
 </p:sldLayout>
 </file>
 
@@ -3237,7 +3323,7 @@
   <p:clrMapOvr>
     <a:masterClrMapping/>
   </p:clrMapOvr>
-  <p:transition/>
+  <p:transition xmlns:p14="http://schemas.microsoft.com/office/powerpoint/2010/main"/>
 </p:sldLayout>
 </file>
 
@@ -3361,7 +3447,7 @@
   <p:clrMapOvr>
     <a:masterClrMapping/>
   </p:clrMapOvr>
-  <p:transition/>
+  <p:transition xmlns:p14="http://schemas.microsoft.com/office/powerpoint/2010/main"/>
 </p:sldLayout>
 </file>
 
@@ -3467,7 +3553,7 @@
   <p:clrMapOvr>
     <a:masterClrMapping/>
   </p:clrMapOvr>
-  <p:transition/>
+  <p:transition xmlns:p14="http://schemas.microsoft.com/office/powerpoint/2010/main"/>
 </p:sldLayout>
 </file>
 
@@ -3595,7 +3681,7 @@
   <p:clrMapOvr>
     <a:masterClrMapping/>
   </p:clrMapOvr>
-  <p:transition/>
+  <p:transition xmlns:p14="http://schemas.microsoft.com/office/powerpoint/2010/main"/>
 </p:sldLayout>
 </file>
 
@@ -3819,7 +3905,7 @@
   <p:clrMapOvr>
     <a:masterClrMapping/>
   </p:clrMapOvr>
-  <p:transition/>
+  <p:transition xmlns:p14="http://schemas.microsoft.com/office/powerpoint/2010/main"/>
 </p:sldLayout>
 </file>
 
@@ -4182,7 +4268,7 @@
   <p:clrMapOvr>
     <a:masterClrMapping/>
   </p:clrMapOvr>
-  <p:transition/>
+  <p:transition xmlns:p14="http://schemas.microsoft.com/office/powerpoint/2010/main"/>
 </p:sldLayout>
 </file>
 
@@ -4236,7 +4322,7 @@
   <p:clrMapOvr>
     <a:masterClrMapping/>
   </p:clrMapOvr>
-  <p:transition/>
+  <p:transition xmlns:p14="http://schemas.microsoft.com/office/powerpoint/2010/main"/>
 </p:sldLayout>
 </file>
 
@@ -4267,7 +4353,7 @@
   <p:clrMapOvr>
     <a:masterClrMapping/>
   </p:clrMapOvr>
-  <p:transition/>
+  <p:transition xmlns:p14="http://schemas.microsoft.com/office/powerpoint/2010/main"/>
 </p:sldLayout>
 </file>
 
@@ -4480,7 +4566,7 @@
   <p:clrMapOvr>
     <a:masterClrMapping/>
   </p:clrMapOvr>
-  <p:transition/>
+  <p:transition xmlns:p14="http://schemas.microsoft.com/office/powerpoint/2010/main"/>
 </p:sldLayout>
 </file>
 
@@ -4672,7 +4758,7 @@
   <p:clrMapOvr>
     <a:masterClrMapping/>
   </p:clrMapOvr>
-  <p:transition/>
+  <p:transition xmlns:p14="http://schemas.microsoft.com/office/powerpoint/2010/main"/>
 </p:sldLayout>
 </file>
 
@@ -4796,7 +4882,7 @@
   <p:clrMapOvr>
     <a:masterClrMapping/>
   </p:clrMapOvr>
-  <p:transition/>
+  <p:transition xmlns:p14="http://schemas.microsoft.com/office/powerpoint/2010/main"/>
 </p:sldLayout>
 </file>
 
@@ -4902,7 +4988,7 @@
   <p:clrMapOvr>
     <a:masterClrMapping/>
   </p:clrMapOvr>
-  <p:transition/>
+  <p:transition xmlns:p14="http://schemas.microsoft.com/office/powerpoint/2010/main"/>
 </p:sldLayout>
 </file>
 
@@ -5018,7 +5104,7 @@
   <p:clrMapOvr>
     <a:masterClrMapping/>
   </p:clrMapOvr>
-  <p:transition/>
+  <p:transition xmlns:p14="http://schemas.microsoft.com/office/powerpoint/2010/main"/>
 </p:sldLayout>
 </file>
 
@@ -5142,7 +5228,7 @@
   <p:clrMapOvr>
     <a:masterClrMapping/>
   </p:clrMapOvr>
-  <p:transition/>
+  <p:transition xmlns:p14="http://schemas.microsoft.com/office/powerpoint/2010/main"/>
 </p:sldLayout>
 </file>
 
@@ -5248,7 +5334,7 @@
   <p:clrMapOvr>
     <a:masterClrMapping/>
   </p:clrMapOvr>
-  <p:transition/>
+  <p:transition xmlns:p14="http://schemas.microsoft.com/office/powerpoint/2010/main"/>
 </p:sldLayout>
 </file>
 
@@ -5376,7 +5462,7 @@
   <p:clrMapOvr>
     <a:masterClrMapping/>
   </p:clrMapOvr>
-  <p:transition/>
+  <p:transition xmlns:p14="http://schemas.microsoft.com/office/powerpoint/2010/main"/>
 </p:sldLayout>
 </file>
 
@@ -5600,7 +5686,7 @@
   <p:clrMapOvr>
     <a:masterClrMapping/>
   </p:clrMapOvr>
-  <p:transition/>
+  <p:transition xmlns:p14="http://schemas.microsoft.com/office/powerpoint/2010/main"/>
 </p:sldLayout>
 </file>
 
@@ -5963,7 +6049,7 @@
   <p:clrMapOvr>
     <a:masterClrMapping/>
   </p:clrMapOvr>
-  <p:transition/>
+  <p:transition xmlns:p14="http://schemas.microsoft.com/office/powerpoint/2010/main"/>
 </p:sldLayout>
 </file>
 
@@ -6017,7 +6103,7 @@
   <p:clrMapOvr>
     <a:masterClrMapping/>
   </p:clrMapOvr>
-  <p:transition/>
+  <p:transition xmlns:p14="http://schemas.microsoft.com/office/powerpoint/2010/main"/>
 </p:sldLayout>
 </file>
 
@@ -6048,7 +6134,7 @@
   <p:clrMapOvr>
     <a:masterClrMapping/>
   </p:clrMapOvr>
-  <p:transition/>
+  <p:transition xmlns:p14="http://schemas.microsoft.com/office/powerpoint/2010/main"/>
 </p:sldLayout>
 </file>
 
@@ -6261,7 +6347,7 @@
   <p:clrMapOvr>
     <a:masterClrMapping/>
   </p:clrMapOvr>
-  <p:transition/>
+  <p:transition xmlns:p14="http://schemas.microsoft.com/office/powerpoint/2010/main"/>
 </p:sldLayout>
 </file>
 
@@ -6367,7 +6453,7 @@
   <p:clrMapOvr>
     <a:masterClrMapping/>
   </p:clrMapOvr>
-  <p:transition/>
+  <p:transition xmlns:p14="http://schemas.microsoft.com/office/powerpoint/2010/main"/>
 </p:sldLayout>
 </file>
 
@@ -6559,7 +6645,7 @@
   <p:clrMapOvr>
     <a:masterClrMapping/>
   </p:clrMapOvr>
-  <p:transition/>
+  <p:transition xmlns:p14="http://schemas.microsoft.com/office/powerpoint/2010/main"/>
 </p:sldLayout>
 </file>
 
@@ -6665,7 +6751,7 @@
   <p:clrMapOvr>
     <a:masterClrMapping/>
   </p:clrMapOvr>
-  <p:transition/>
+  <p:transition xmlns:p14="http://schemas.microsoft.com/office/powerpoint/2010/main"/>
 </p:sldLayout>
 </file>
 
@@ -6781,7 +6867,7 @@
   <p:clrMapOvr>
     <a:masterClrMapping/>
   </p:clrMapOvr>
-  <p:transition/>
+  <p:transition xmlns:p14="http://schemas.microsoft.com/office/powerpoint/2010/main"/>
 </p:sldLayout>
 </file>
 
@@ -6905,7 +6991,7 @@
   <p:clrMapOvr>
     <a:masterClrMapping/>
   </p:clrMapOvr>
-  <p:transition/>
+  <p:transition xmlns:p14="http://schemas.microsoft.com/office/powerpoint/2010/main"/>
 </p:sldLayout>
 </file>
 
@@ -7011,7 +7097,7 @@
   <p:clrMapOvr>
     <a:masterClrMapping/>
   </p:clrMapOvr>
-  <p:transition/>
+  <p:transition xmlns:p14="http://schemas.microsoft.com/office/powerpoint/2010/main"/>
 </p:sldLayout>
 </file>
 
@@ -7139,7 +7225,7 @@
   <p:clrMapOvr>
     <a:masterClrMapping/>
   </p:clrMapOvr>
-  <p:transition/>
+  <p:transition xmlns:p14="http://schemas.microsoft.com/office/powerpoint/2010/main"/>
 </p:sldLayout>
 </file>
 
@@ -7363,7 +7449,7 @@
   <p:clrMapOvr>
     <a:masterClrMapping/>
   </p:clrMapOvr>
-  <p:transition/>
+  <p:transition xmlns:p14="http://schemas.microsoft.com/office/powerpoint/2010/main"/>
 </p:sldLayout>
 </file>
 
@@ -7726,7 +7812,7 @@
   <p:clrMapOvr>
     <a:masterClrMapping/>
   </p:clrMapOvr>
-  <p:transition/>
+  <p:transition xmlns:p14="http://schemas.microsoft.com/office/powerpoint/2010/main"/>
 </p:sldLayout>
 </file>
 
@@ -7780,7 +7866,7 @@
   <p:clrMapOvr>
     <a:masterClrMapping/>
   </p:clrMapOvr>
-  <p:transition/>
+  <p:transition xmlns:p14="http://schemas.microsoft.com/office/powerpoint/2010/main"/>
 </p:sldLayout>
 </file>
 
@@ -7811,7 +7897,7 @@
   <p:clrMapOvr>
     <a:masterClrMapping/>
   </p:clrMapOvr>
-  <p:transition/>
+  <p:transition xmlns:p14="http://schemas.microsoft.com/office/powerpoint/2010/main"/>
 </p:sldLayout>
 </file>
 
@@ -7939,7 +8025,7 @@
   <p:clrMapOvr>
     <a:masterClrMapping/>
   </p:clrMapOvr>
-  <p:transition/>
+  <p:transition xmlns:p14="http://schemas.microsoft.com/office/powerpoint/2010/main"/>
 </p:sldLayout>
 </file>
 
@@ -8152,7 +8238,7 @@
   <p:clrMapOvr>
     <a:masterClrMapping/>
   </p:clrMapOvr>
-  <p:transition/>
+  <p:transition xmlns:p14="http://schemas.microsoft.com/office/powerpoint/2010/main"/>
 </p:sldLayout>
 </file>
 
@@ -8344,7 +8430,7 @@
   <p:clrMapOvr>
     <a:masterClrMapping/>
   </p:clrMapOvr>
-  <p:transition/>
+  <p:transition xmlns:p14="http://schemas.microsoft.com/office/powerpoint/2010/main"/>
 </p:sldLayout>
 </file>
 
@@ -8450,7 +8536,7 @@
   <p:clrMapOvr>
     <a:masterClrMapping/>
   </p:clrMapOvr>
-  <p:transition/>
+  <p:transition xmlns:p14="http://schemas.microsoft.com/office/powerpoint/2010/main"/>
 </p:sldLayout>
 </file>
 
@@ -8566,7 +8652,7 @@
   <p:clrMapOvr>
     <a:masterClrMapping/>
   </p:clrMapOvr>
-  <p:transition/>
+  <p:transition xmlns:p14="http://schemas.microsoft.com/office/powerpoint/2010/main"/>
 </p:sldLayout>
 </file>
 
@@ -8690,7 +8776,7 @@
   <p:clrMapOvr>
     <a:masterClrMapping/>
   </p:clrMapOvr>
-  <p:transition/>
+  <p:transition xmlns:p14="http://schemas.microsoft.com/office/powerpoint/2010/main"/>
 </p:sldLayout>
 </file>
 
@@ -8796,7 +8882,7 @@
   <p:clrMapOvr>
     <a:masterClrMapping/>
   </p:clrMapOvr>
-  <p:transition/>
+  <p:transition xmlns:p14="http://schemas.microsoft.com/office/powerpoint/2010/main"/>
 </p:sldLayout>
 </file>
 
@@ -8924,7 +9010,7 @@
   <p:clrMapOvr>
     <a:masterClrMapping/>
   </p:clrMapOvr>
-  <p:transition/>
+  <p:transition xmlns:p14="http://schemas.microsoft.com/office/powerpoint/2010/main"/>
 </p:sldLayout>
 </file>
 
@@ -9148,7 +9234,7 @@
   <p:clrMapOvr>
     <a:masterClrMapping/>
   </p:clrMapOvr>
-  <p:transition/>
+  <p:transition xmlns:p14="http://schemas.microsoft.com/office/powerpoint/2010/main"/>
 </p:sldLayout>
 </file>
 
@@ -9511,7 +9597,7 @@
   <p:clrMapOvr>
     <a:masterClrMapping/>
   </p:clrMapOvr>
-  <p:transition/>
+  <p:transition xmlns:p14="http://schemas.microsoft.com/office/powerpoint/2010/main"/>
 </p:sldLayout>
 </file>
 
@@ -9565,7 +9651,7 @@
   <p:clrMapOvr>
     <a:masterClrMapping/>
   </p:clrMapOvr>
-  <p:transition/>
+  <p:transition xmlns:p14="http://schemas.microsoft.com/office/powerpoint/2010/main"/>
 </p:sldLayout>
 </file>
 
@@ -9789,7 +9875,7 @@
   <p:clrMapOvr>
     <a:masterClrMapping/>
   </p:clrMapOvr>
-  <p:transition/>
+  <p:transition xmlns:p14="http://schemas.microsoft.com/office/powerpoint/2010/main"/>
 </p:sldLayout>
 </file>
 
@@ -9820,7 +9906,7 @@
   <p:clrMapOvr>
     <a:masterClrMapping/>
   </p:clrMapOvr>
-  <p:transition/>
+  <p:transition xmlns:p14="http://schemas.microsoft.com/office/powerpoint/2010/main"/>
 </p:sldLayout>
 </file>
 
@@ -10033,7 +10119,7 @@
   <p:clrMapOvr>
     <a:masterClrMapping/>
   </p:clrMapOvr>
-  <p:transition/>
+  <p:transition xmlns:p14="http://schemas.microsoft.com/office/powerpoint/2010/main"/>
 </p:sldLayout>
 </file>
 
@@ -10225,7 +10311,7 @@
   <p:clrMapOvr>
     <a:masterClrMapping/>
   </p:clrMapOvr>
-  <p:transition/>
+  <p:transition xmlns:p14="http://schemas.microsoft.com/office/powerpoint/2010/main"/>
 </p:sldLayout>
 </file>
 
@@ -10331,7 +10417,7 @@
   <p:clrMapOvr>
     <a:masterClrMapping/>
   </p:clrMapOvr>
-  <p:transition/>
+  <p:transition xmlns:p14="http://schemas.microsoft.com/office/powerpoint/2010/main"/>
 </p:sldLayout>
 </file>
 
@@ -10447,7 +10533,7 @@
   <p:clrMapOvr>
     <a:masterClrMapping/>
   </p:clrMapOvr>
-  <p:transition/>
+  <p:transition xmlns:p14="http://schemas.microsoft.com/office/powerpoint/2010/main"/>
 </p:sldLayout>
 </file>
 
@@ -10810,7 +10896,7 @@
   <p:clrMapOvr>
     <a:masterClrMapping/>
   </p:clrMapOvr>
-  <p:transition/>
+  <p:transition xmlns:p14="http://schemas.microsoft.com/office/powerpoint/2010/main"/>
 </p:sldLayout>
 </file>
 
@@ -10864,7 +10950,7 @@
   <p:clrMapOvr>
     <a:masterClrMapping/>
   </p:clrMapOvr>
-  <p:transition/>
+  <p:transition xmlns:p14="http://schemas.microsoft.com/office/powerpoint/2010/main"/>
 </p:sldLayout>
 </file>
 
@@ -10895,7 +10981,7 @@
   <p:clrMapOvr>
     <a:masterClrMapping/>
   </p:clrMapOvr>
-  <p:transition/>
+  <p:transition xmlns:p14="http://schemas.microsoft.com/office/powerpoint/2010/main"/>
 </p:sldLayout>
 </file>
 
@@ -11108,7 +11194,7 @@
   <p:clrMapOvr>
     <a:masterClrMapping/>
   </p:clrMapOvr>
-  <p:transition/>
+  <p:transition xmlns:p14="http://schemas.microsoft.com/office/powerpoint/2010/main"/>
 </p:sldLayout>
 </file>
 
@@ -11214,7 +11300,7 @@
   <p:clrMapOvr>
     <a:masterClrMapping/>
   </p:clrMapOvr>
-  <p:transition/>
+  <p:transition xmlns:p14="http://schemas.microsoft.com/office/powerpoint/2010/main"/>
 </p:sldLayout>
 </file>
 
@@ -11406,7 +11492,7 @@
   <p:clrMapOvr>
     <a:masterClrMapping/>
   </p:clrMapOvr>
-  <p:transition/>
+  <p:transition xmlns:p14="http://schemas.microsoft.com/office/powerpoint/2010/main"/>
 </p:sldLayout>
 </file>
 
@@ -11512,7 +11598,7 @@
   <p:clrMapOvr>
     <a:masterClrMapping/>
   </p:clrMapOvr>
-  <p:transition/>
+  <p:transition xmlns:p14="http://schemas.microsoft.com/office/powerpoint/2010/main"/>
 </p:sldLayout>
 </file>
 
@@ -11628,7 +11714,7 @@
   <p:clrMapOvr>
     <a:masterClrMapping/>
   </p:clrMapOvr>
-  <p:transition/>
+  <p:transition xmlns:p14="http://schemas.microsoft.com/office/powerpoint/2010/main"/>
 </p:sldLayout>
 </file>
 
@@ -11755,7 +11841,7 @@
   <p:clrMapOvr>
     <a:masterClrMapping/>
   </p:clrMapOvr>
-  <p:transition/>
+  <p:transition xmlns:p14="http://schemas.microsoft.com/office/powerpoint/2010/main"/>
 </p:sldLayout>
 </file>
 
@@ -11869,7 +11955,7 @@
   <p:clrMapOvr>
     <a:masterClrMapping/>
   </p:clrMapOvr>
-  <p:transition/>
+  <p:transition xmlns:p14="http://schemas.microsoft.com/office/powerpoint/2010/main"/>
 </p:sldLayout>
 </file>
 
@@ -12000,7 +12086,7 @@
   <p:clrMapOvr>
     <a:masterClrMapping/>
   </p:clrMapOvr>
-  <p:transition/>
+  <p:transition xmlns:p14="http://schemas.microsoft.com/office/powerpoint/2010/main"/>
 </p:sldLayout>
 </file>
 
@@ -12230,7 +12316,7 @@
   <p:clrMapOvr>
     <a:masterClrMapping/>
   </p:clrMapOvr>
-  <p:transition/>
+  <p:transition xmlns:p14="http://schemas.microsoft.com/office/powerpoint/2010/main"/>
 </p:sldLayout>
 </file>
 
@@ -12605,7 +12691,7 @@
   <p:clrMapOvr>
     <a:masterClrMapping/>
   </p:clrMapOvr>
-  <p:transition/>
+  <p:transition xmlns:p14="http://schemas.microsoft.com/office/powerpoint/2010/main"/>
 </p:sldLayout>
 </file>
 
@@ -12659,7 +12745,7 @@
   <p:clrMapOvr>
     <a:masterClrMapping/>
   </p:clrMapOvr>
-  <p:transition/>
+  <p:transition xmlns:p14="http://schemas.microsoft.com/office/powerpoint/2010/main"/>
 </p:sldLayout>
 </file>
 
@@ -12690,7 +12776,7 @@
   <p:clrMapOvr>
     <a:masterClrMapping/>
   </p:clrMapOvr>
-  <p:transition/>
+  <p:transition xmlns:p14="http://schemas.microsoft.com/office/powerpoint/2010/main"/>
 </p:sldLayout>
 </file>
 
@@ -12818,7 +12904,7 @@
   <p:clrMapOvr>
     <a:masterClrMapping/>
   </p:clrMapOvr>
-  <p:transition/>
+  <p:transition xmlns:p14="http://schemas.microsoft.com/office/powerpoint/2010/main"/>
 </p:sldLayout>
 </file>
 
@@ -13037,7 +13123,7 @@
   <p:clrMapOvr>
     <a:masterClrMapping/>
   </p:clrMapOvr>
-  <p:transition/>
+  <p:transition xmlns:p14="http://schemas.microsoft.com/office/powerpoint/2010/main"/>
 </p:sldLayout>
 </file>
 
@@ -13235,7 +13321,7 @@
   <p:clrMapOvr>
     <a:masterClrMapping/>
   </p:clrMapOvr>
-  <p:transition/>
+  <p:transition xmlns:p14="http://schemas.microsoft.com/office/powerpoint/2010/main"/>
 </p:sldLayout>
 </file>
 
@@ -13349,7 +13435,7 @@
   <p:clrMapOvr>
     <a:masterClrMapping/>
   </p:clrMapOvr>
-  <p:transition/>
+  <p:transition xmlns:p14="http://schemas.microsoft.com/office/powerpoint/2010/main"/>
 </p:sldLayout>
 </file>
 
@@ -13468,7 +13554,7 @@
   <p:clrMapOvr>
     <a:masterClrMapping/>
   </p:clrMapOvr>
-  <p:transition/>
+  <p:transition xmlns:p14="http://schemas.microsoft.com/office/powerpoint/2010/main"/>
 </p:sldLayout>
 </file>
 
@@ -13595,7 +13681,7 @@
   <p:clrMapOvr>
     <a:masterClrMapping/>
   </p:clrMapOvr>
-  <p:transition/>
+  <p:transition xmlns:p14="http://schemas.microsoft.com/office/powerpoint/2010/main"/>
 </p:sldLayout>
 </file>
 
@@ -13709,7 +13795,7 @@
   <p:clrMapOvr>
     <a:masterClrMapping/>
   </p:clrMapOvr>
-  <p:transition/>
+  <p:transition xmlns:p14="http://schemas.microsoft.com/office/powerpoint/2010/main"/>
 </p:sldLayout>
 </file>
 
@@ -13840,7 +13926,7 @@
   <p:clrMapOvr>
     <a:masterClrMapping/>
   </p:clrMapOvr>
-  <p:transition/>
+  <p:transition xmlns:p14="http://schemas.microsoft.com/office/powerpoint/2010/main"/>
 </p:sldLayout>
 </file>
 
@@ -14072,7 +14158,7 @@
   <p:clrMapOvr>
     <a:masterClrMapping/>
   </p:clrMapOvr>
-  <p:transition/>
+  <p:transition xmlns:p14="http://schemas.microsoft.com/office/powerpoint/2010/main"/>
 </p:sldLayout>
 </file>
 
@@ -14438,7 +14524,7 @@
   <p:clrMapOvr>
     <a:masterClrMapping/>
   </p:clrMapOvr>
-  <p:transition/>
+  <p:transition xmlns:p14="http://schemas.microsoft.com/office/powerpoint/2010/main"/>
 </p:sldLayout>
 </file>
 
@@ -14500,7 +14586,7 @@
   <p:clrMapOvr>
     <a:masterClrMapping/>
   </p:clrMapOvr>
-  <p:transition/>
+  <p:transition xmlns:p14="http://schemas.microsoft.com/office/powerpoint/2010/main"/>
 </p:sldLayout>
 </file>
 
@@ -14724,7 +14810,7 @@
   <p:clrMapOvr>
     <a:masterClrMapping/>
   </p:clrMapOvr>
-  <p:transition/>
+  <p:transition xmlns:p14="http://schemas.microsoft.com/office/powerpoint/2010/main"/>
 </p:sldLayout>
 </file>
 
@@ -14755,7 +14841,7 @@
   <p:clrMapOvr>
     <a:masterClrMapping/>
   </p:clrMapOvr>
-  <p:transition/>
+  <p:transition xmlns:p14="http://schemas.microsoft.com/office/powerpoint/2010/main"/>
 </p:sldLayout>
 </file>
 
@@ -14971,7 +15057,7 @@
   <p:clrMapOvr>
     <a:masterClrMapping/>
   </p:clrMapOvr>
-  <p:transition/>
+  <p:transition xmlns:p14="http://schemas.microsoft.com/office/powerpoint/2010/main"/>
 </p:sldLayout>
 </file>
 
@@ -15166,7 +15252,7 @@
   <p:clrMapOvr>
     <a:masterClrMapping/>
   </p:clrMapOvr>
-  <p:transition/>
+  <p:transition xmlns:p14="http://schemas.microsoft.com/office/powerpoint/2010/main"/>
 </p:sldLayout>
 </file>
 
@@ -15280,7 +15366,7 @@
   <p:clrMapOvr>
     <a:masterClrMapping/>
   </p:clrMapOvr>
-  <p:transition/>
+  <p:transition xmlns:p14="http://schemas.microsoft.com/office/powerpoint/2010/main"/>
 </p:sldLayout>
 </file>
 
@@ -15399,7 +15485,7 @@
   <p:clrMapOvr>
     <a:masterClrMapping/>
   </p:clrMapOvr>
-  <p:transition/>
+  <p:transition xmlns:p14="http://schemas.microsoft.com/office/powerpoint/2010/main"/>
 </p:sldLayout>
 </file>
 
@@ -15526,7 +15612,7 @@
   <p:clrMapOvr>
     <a:masterClrMapping/>
   </p:clrMapOvr>
-  <p:transition/>
+  <p:transition xmlns:p14="http://schemas.microsoft.com/office/powerpoint/2010/main"/>
 </p:sldLayout>
 </file>
 
@@ -15640,7 +15726,7 @@
   <p:clrMapOvr>
     <a:masterClrMapping/>
   </p:clrMapOvr>
-  <p:transition/>
+  <p:transition xmlns:p14="http://schemas.microsoft.com/office/powerpoint/2010/main"/>
 </p:sldLayout>
 </file>
 
@@ -15771,7 +15857,7 @@
   <p:clrMapOvr>
     <a:masterClrMapping/>
   </p:clrMapOvr>
-  <p:transition/>
+  <p:transition xmlns:p14="http://schemas.microsoft.com/office/powerpoint/2010/main"/>
 </p:sldLayout>
 </file>
 
@@ -16001,7 +16087,7 @@
   <p:clrMapOvr>
     <a:masterClrMapping/>
   </p:clrMapOvr>
-  <p:transition/>
+  <p:transition xmlns:p14="http://schemas.microsoft.com/office/powerpoint/2010/main"/>
 </p:sldLayout>
 </file>
 
@@ -16376,7 +16462,7 @@
   <p:clrMapOvr>
     <a:masterClrMapping/>
   </p:clrMapOvr>
-  <p:transition/>
+  <p:transition xmlns:p14="http://schemas.microsoft.com/office/powerpoint/2010/main"/>
 </p:sldLayout>
 </file>
 
@@ -16739,7 +16825,7 @@
   <p:clrMapOvr>
     <a:masterClrMapping/>
   </p:clrMapOvr>
-  <p:transition/>
+  <p:transition xmlns:p14="http://schemas.microsoft.com/office/powerpoint/2010/main"/>
 </p:sldLayout>
 </file>
 
@@ -16793,7 +16879,7 @@
   <p:clrMapOvr>
     <a:masterClrMapping/>
   </p:clrMapOvr>
-  <p:transition/>
+  <p:transition xmlns:p14="http://schemas.microsoft.com/office/powerpoint/2010/main"/>
 </p:sldLayout>
 </file>
 
@@ -16824,7 +16910,7 @@
   <p:clrMapOvr>
     <a:masterClrMapping/>
   </p:clrMapOvr>
-  <p:transition/>
+  <p:transition xmlns:p14="http://schemas.microsoft.com/office/powerpoint/2010/main"/>
 </p:sldLayout>
 </file>
 
@@ -17043,7 +17129,7 @@
   <p:clrMapOvr>
     <a:masterClrMapping/>
   </p:clrMapOvr>
-  <p:transition/>
+  <p:transition xmlns:p14="http://schemas.microsoft.com/office/powerpoint/2010/main"/>
 </p:sldLayout>
 </file>
 
@@ -17241,7 +17327,7 @@
   <p:clrMapOvr>
     <a:masterClrMapping/>
   </p:clrMapOvr>
-  <p:transition/>
+  <p:transition xmlns:p14="http://schemas.microsoft.com/office/powerpoint/2010/main"/>
 </p:sldLayout>
 </file>
 
@@ -17355,7 +17441,7 @@
   <p:clrMapOvr>
     <a:masterClrMapping/>
   </p:clrMapOvr>
-  <p:transition/>
+  <p:transition xmlns:p14="http://schemas.microsoft.com/office/powerpoint/2010/main"/>
 </p:sldLayout>
 </file>
 
@@ -17474,7 +17560,7 @@
   <p:clrMapOvr>
     <a:masterClrMapping/>
   </p:clrMapOvr>
-  <p:transition/>
+  <p:transition xmlns:p14="http://schemas.microsoft.com/office/powerpoint/2010/main"/>
 </p:sldLayout>
 </file>
 
@@ -17601,7 +17687,7 @@
   <p:clrMapOvr>
     <a:masterClrMapping/>
   </p:clrMapOvr>
-  <p:transition/>
+  <p:transition xmlns:p14="http://schemas.microsoft.com/office/powerpoint/2010/main"/>
 </p:sldLayout>
 </file>
 
@@ -17715,7 +17801,7 @@
   <p:clrMapOvr>
     <a:masterClrMapping/>
   </p:clrMapOvr>
-  <p:transition/>
+  <p:transition xmlns:p14="http://schemas.microsoft.com/office/powerpoint/2010/main"/>
 </p:sldLayout>
 </file>
 
@@ -17846,7 +17932,7 @@
   <p:clrMapOvr>
     <a:masterClrMapping/>
   </p:clrMapOvr>
-  <p:transition/>
+  <p:transition xmlns:p14="http://schemas.microsoft.com/office/powerpoint/2010/main"/>
 </p:sldLayout>
 </file>
 
@@ -18076,7 +18162,7 @@
   <p:clrMapOvr>
     <a:masterClrMapping/>
   </p:clrMapOvr>
-  <p:transition/>
+  <p:transition xmlns:p14="http://schemas.microsoft.com/office/powerpoint/2010/main"/>
 </p:sldLayout>
 </file>
 
@@ -18130,7 +18216,7 @@
   <p:clrMapOvr>
     <a:masterClrMapping/>
   </p:clrMapOvr>
-  <p:transition/>
+  <p:transition xmlns:p14="http://schemas.microsoft.com/office/powerpoint/2010/main"/>
 </p:sldLayout>
 </file>
 
@@ -18505,7 +18591,7 @@
   <p:clrMapOvr>
     <a:masterClrMapping/>
   </p:clrMapOvr>
-  <p:transition/>
+  <p:transition xmlns:p14="http://schemas.microsoft.com/office/powerpoint/2010/main"/>
 </p:sldLayout>
 </file>
 
@@ -18559,7 +18645,7 @@
   <p:clrMapOvr>
     <a:masterClrMapping/>
   </p:clrMapOvr>
-  <p:transition/>
+  <p:transition xmlns:p14="http://schemas.microsoft.com/office/powerpoint/2010/main"/>
 </p:sldLayout>
 </file>
 
@@ -18590,7 +18676,7 @@
   <p:clrMapOvr>
     <a:masterClrMapping/>
   </p:clrMapOvr>
-  <p:transition/>
+  <p:transition xmlns:p14="http://schemas.microsoft.com/office/powerpoint/2010/main"/>
 </p:sldLayout>
 </file>
 
@@ -18809,7 +18895,7 @@
   <p:clrMapOvr>
     <a:masterClrMapping/>
   </p:clrMapOvr>
-  <p:transition/>
+  <p:transition xmlns:p14="http://schemas.microsoft.com/office/powerpoint/2010/main"/>
 </p:sldLayout>
 </file>
 
@@ -19007,7 +19093,7 @@
   <p:clrMapOvr>
     <a:masterClrMapping/>
   </p:clrMapOvr>
-  <p:transition/>
+  <p:transition xmlns:p14="http://schemas.microsoft.com/office/powerpoint/2010/main"/>
 </p:sldLayout>
 </file>
 
@@ -19121,7 +19207,7 @@
   <p:clrMapOvr>
     <a:masterClrMapping/>
   </p:clrMapOvr>
-  <p:transition/>
+  <p:transition xmlns:p14="http://schemas.microsoft.com/office/powerpoint/2010/main"/>
 </p:sldLayout>
 </file>
 
@@ -19240,7 +19326,7 @@
   <p:clrMapOvr>
     <a:masterClrMapping/>
   </p:clrMapOvr>
-  <p:transition/>
+  <p:transition xmlns:p14="http://schemas.microsoft.com/office/powerpoint/2010/main"/>
 </p:sldLayout>
 </file>
 
@@ -19364,7 +19450,7 @@
   <p:clrMapOvr>
     <a:masterClrMapping/>
   </p:clrMapOvr>
-  <p:transition/>
+  <p:transition xmlns:p14="http://schemas.microsoft.com/office/powerpoint/2010/main"/>
 </p:sldLayout>
 </file>
 
@@ -19470,7 +19556,7 @@
   <p:clrMapOvr>
     <a:masterClrMapping/>
   </p:clrMapOvr>
-  <p:transition/>
+  <p:transition xmlns:p14="http://schemas.microsoft.com/office/powerpoint/2010/main"/>
 </p:sldLayout>
 </file>
 
@@ -19598,7 +19684,7 @@
   <p:clrMapOvr>
     <a:masterClrMapping/>
   </p:clrMapOvr>
-  <p:transition/>
+  <p:transition xmlns:p14="http://schemas.microsoft.com/office/powerpoint/2010/main"/>
 </p:sldLayout>
 </file>
 
@@ -19629,7 +19715,7 @@
   <p:clrMapOvr>
     <a:masterClrMapping/>
   </p:clrMapOvr>
-  <p:transition/>
+  <p:transition xmlns:p14="http://schemas.microsoft.com/office/powerpoint/2010/main"/>
 </p:sldLayout>
 </file>
 
@@ -19853,7 +19939,7 @@
   <p:clrMapOvr>
     <a:masterClrMapping/>
   </p:clrMapOvr>
-  <p:transition/>
+  <p:transition xmlns:p14="http://schemas.microsoft.com/office/powerpoint/2010/main"/>
 </p:sldLayout>
 </file>
 
@@ -20216,7 +20302,7 @@
   <p:clrMapOvr>
     <a:masterClrMapping/>
   </p:clrMapOvr>
-  <p:transition/>
+  <p:transition xmlns:p14="http://schemas.microsoft.com/office/powerpoint/2010/main"/>
 </p:sldLayout>
 </file>
 
@@ -20270,7 +20356,7 @@
   <p:clrMapOvr>
     <a:masterClrMapping/>
   </p:clrMapOvr>
-  <p:transition/>
+  <p:transition xmlns:p14="http://schemas.microsoft.com/office/powerpoint/2010/main"/>
 </p:sldLayout>
 </file>
 
@@ -20301,7 +20387,7 @@
   <p:clrMapOvr>
     <a:masterClrMapping/>
   </p:clrMapOvr>
-  <p:transition/>
+  <p:transition xmlns:p14="http://schemas.microsoft.com/office/powerpoint/2010/main"/>
 </p:sldLayout>
 </file>
 
@@ -20514,7 +20600,7 @@
   <p:clrMapOvr>
     <a:masterClrMapping/>
   </p:clrMapOvr>
-  <p:transition/>
+  <p:transition xmlns:p14="http://schemas.microsoft.com/office/powerpoint/2010/main"/>
 </p:sldLayout>
 </file>
 
@@ -20706,7 +20792,7 @@
   <p:clrMapOvr>
     <a:masterClrMapping/>
   </p:clrMapOvr>
-  <p:transition/>
+  <p:transition xmlns:p14="http://schemas.microsoft.com/office/powerpoint/2010/main"/>
 </p:sldLayout>
 </file>
 
@@ -20812,7 +20898,7 @@
   <p:clrMapOvr>
     <a:masterClrMapping/>
   </p:clrMapOvr>
-  <p:transition/>
+  <p:transition xmlns:p14="http://schemas.microsoft.com/office/powerpoint/2010/main"/>
 </p:sldLayout>
 </file>
 
@@ -20928,7 +21014,7 @@
   <p:clrMapOvr>
     <a:masterClrMapping/>
   </p:clrMapOvr>
-  <p:transition/>
+  <p:transition xmlns:p14="http://schemas.microsoft.com/office/powerpoint/2010/main"/>
 </p:sldLayout>
 </file>
 
@@ -21052,7 +21138,7 @@
   <p:clrMapOvr>
     <a:masterClrMapping/>
   </p:clrMapOvr>
-  <p:transition/>
+  <p:transition xmlns:p14="http://schemas.microsoft.com/office/powerpoint/2010/main"/>
 </p:sldLayout>
 </file>
 
@@ -21158,7 +21244,7 @@
   <p:clrMapOvr>
     <a:masterClrMapping/>
   </p:clrMapOvr>
-  <p:transition/>
+  <p:transition xmlns:p14="http://schemas.microsoft.com/office/powerpoint/2010/main"/>
 </p:sldLayout>
 </file>
 
@@ -21371,7 +21457,7 @@
   <p:clrMapOvr>
     <a:masterClrMapping/>
   </p:clrMapOvr>
-  <p:transition/>
+  <p:transition xmlns:p14="http://schemas.microsoft.com/office/powerpoint/2010/main"/>
 </p:sldLayout>
 </file>
 
@@ -21499,7 +21585,7 @@
   <p:clrMapOvr>
     <a:masterClrMapping/>
   </p:clrMapOvr>
-  <p:transition/>
+  <p:transition xmlns:p14="http://schemas.microsoft.com/office/powerpoint/2010/main"/>
 </p:sldLayout>
 </file>
 
@@ -21723,7 +21809,7 @@
   <p:clrMapOvr>
     <a:masterClrMapping/>
   </p:clrMapOvr>
-  <p:transition/>
+  <p:transition xmlns:p14="http://schemas.microsoft.com/office/powerpoint/2010/main"/>
 </p:sldLayout>
 </file>
 
@@ -22086,7 +22172,7 @@
   <p:clrMapOvr>
     <a:masterClrMapping/>
   </p:clrMapOvr>
-  <p:transition/>
+  <p:transition xmlns:p14="http://schemas.microsoft.com/office/powerpoint/2010/main"/>
 </p:sldLayout>
 </file>
 
@@ -22140,7 +22226,7 @@
   <p:clrMapOvr>
     <a:masterClrMapping/>
   </p:clrMapOvr>
-  <p:transition/>
+  <p:transition xmlns:p14="http://schemas.microsoft.com/office/powerpoint/2010/main"/>
 </p:sldLayout>
 </file>
 
@@ -22171,7 +22257,7 @@
   <p:clrMapOvr>
     <a:masterClrMapping/>
   </p:clrMapOvr>
-  <p:transition/>
+  <p:transition xmlns:p14="http://schemas.microsoft.com/office/powerpoint/2010/main"/>
 </p:sldLayout>
 </file>
 
@@ -22384,7 +22470,7 @@
   <p:clrMapOvr>
     <a:masterClrMapping/>
   </p:clrMapOvr>
-  <p:transition/>
+  <p:transition xmlns:p14="http://schemas.microsoft.com/office/powerpoint/2010/main"/>
 </p:sldLayout>
 </file>
 
@@ -22576,7 +22662,7 @@
   <p:clrMapOvr>
     <a:masterClrMapping/>
   </p:clrMapOvr>
-  <p:transition/>
+  <p:transition xmlns:p14="http://schemas.microsoft.com/office/powerpoint/2010/main"/>
 </p:sldLayout>
 </file>
 
@@ -22682,7 +22768,7 @@
   <p:clrMapOvr>
     <a:masterClrMapping/>
   </p:clrMapOvr>
-  <p:transition/>
+  <p:transition xmlns:p14="http://schemas.microsoft.com/office/powerpoint/2010/main"/>
 </p:sldLayout>
 </file>
 
@@ -22798,7 +22884,7 @@
   <p:clrMapOvr>
     <a:masterClrMapping/>
   </p:clrMapOvr>
-  <p:transition/>
+  <p:transition xmlns:p14="http://schemas.microsoft.com/office/powerpoint/2010/main"/>
 </p:sldLayout>
 </file>
 
@@ -22925,7 +23011,7 @@
   <p:clrMapOvr>
     <a:masterClrMapping/>
   </p:clrMapOvr>
-  <p:transition/>
+  <p:transition xmlns:p14="http://schemas.microsoft.com/office/powerpoint/2010/main"/>
 </p:sldLayout>
 </file>
 
@@ -23117,7 +23203,7 @@
   <p:clrMapOvr>
     <a:masterClrMapping/>
   </p:clrMapOvr>
-  <p:transition/>
+  <p:transition xmlns:p14="http://schemas.microsoft.com/office/powerpoint/2010/main"/>
 </p:sldLayout>
 </file>
 
@@ -23231,7 +23317,7 @@
   <p:clrMapOvr>
     <a:masterClrMapping/>
   </p:clrMapOvr>
-  <p:transition/>
+  <p:transition xmlns:p14="http://schemas.microsoft.com/office/powerpoint/2010/main"/>
 </p:sldLayout>
 </file>
 
@@ -23362,7 +23448,7 @@
   <p:clrMapOvr>
     <a:masterClrMapping/>
   </p:clrMapOvr>
-  <p:transition/>
+  <p:transition xmlns:p14="http://schemas.microsoft.com/office/powerpoint/2010/main"/>
 </p:sldLayout>
 </file>
 
@@ -23592,7 +23678,7 @@
   <p:clrMapOvr>
     <a:masterClrMapping/>
   </p:clrMapOvr>
-  <p:transition/>
+  <p:transition xmlns:p14="http://schemas.microsoft.com/office/powerpoint/2010/main"/>
 </p:sldLayout>
 </file>
 
@@ -23967,7 +24053,7 @@
   <p:clrMapOvr>
     <a:masterClrMapping/>
   </p:clrMapOvr>
-  <p:transition/>
+  <p:transition xmlns:p14="http://schemas.microsoft.com/office/powerpoint/2010/main"/>
 </p:sldLayout>
 </file>
 
@@ -24021,7 +24107,7 @@
   <p:clrMapOvr>
     <a:masterClrMapping/>
   </p:clrMapOvr>
-  <p:transition/>
+  <p:transition xmlns:p14="http://schemas.microsoft.com/office/powerpoint/2010/main"/>
 </p:sldLayout>
 </file>
 
@@ -24052,7 +24138,7 @@
   <p:clrMapOvr>
     <a:masterClrMapping/>
   </p:clrMapOvr>
-  <p:transition/>
+  <p:transition xmlns:p14="http://schemas.microsoft.com/office/powerpoint/2010/main"/>
 </p:sldLayout>
 </file>
 
@@ -24271,7 +24357,7 @@
   <p:clrMapOvr>
     <a:masterClrMapping/>
   </p:clrMapOvr>
-  <p:transition/>
+  <p:transition xmlns:p14="http://schemas.microsoft.com/office/powerpoint/2010/main"/>
 </p:sldLayout>
 </file>
 
@@ -24469,7 +24555,7 @@
   <p:clrMapOvr>
     <a:masterClrMapping/>
   </p:clrMapOvr>
-  <p:transition/>
+  <p:transition xmlns:p14="http://schemas.microsoft.com/office/powerpoint/2010/main"/>
 </p:sldLayout>
 </file>
 
@@ -24583,7 +24669,7 @@
   <p:clrMapOvr>
     <a:masterClrMapping/>
   </p:clrMapOvr>
-  <p:transition/>
+  <p:transition xmlns:p14="http://schemas.microsoft.com/office/powerpoint/2010/main"/>
 </p:sldLayout>
 </file>
 
@@ -24702,7 +24788,7 @@
   <p:clrMapOvr>
     <a:masterClrMapping/>
   </p:clrMapOvr>
-  <p:transition/>
+  <p:transition xmlns:p14="http://schemas.microsoft.com/office/powerpoint/2010/main"/>
 </p:sldLayout>
 </file>
 
@@ -24755,14 +24841,14 @@
           </a:ln>
           <a:effectLst/>
           <a:extLst>
-            <a:ext uri="{909E8E84-426E-40DD-AFC4-6F175D3DCCD1}">
+            <a:ext uri="{909E8E84-426E-40dd-AFC4-6F175D3DCCD1}">
               <a14:hiddenFill xmlns:a14="http://schemas.microsoft.com/office/drawing/2010/main">
                 <a:solidFill>
                   <a:srgbClr val="FFFFFF"/>
                 </a:solidFill>
               </a14:hiddenFill>
             </a:ext>
-            <a:ext uri="{91240B29-F687-4F45-9708-019B960494DF}">
+            <a:ext uri="{91240B29-F687-4f45-9708-019B960494DF}">
               <a14:hiddenLine xmlns:a14="http://schemas.microsoft.com/office/drawing/2010/main" w="12700">
                 <a:solidFill>
                   <a:schemeClr val="tx1"/>
@@ -24772,7 +24858,7 @@
                 <a:tailEnd/>
               </a14:hiddenLine>
             </a:ext>
-            <a:ext uri="{AF507438-7753-43E0-B8FC-AC1667EBCBE1}">
+            <a:ext uri="{AF507438-7753-43e0-B8FC-AC1667EBCBE1}">
               <a14:hiddenEffects xmlns:a14="http://schemas.microsoft.com/office/drawing/2010/main">
                 <a:effectLst>
                   <a:outerShdw blurRad="63500" dist="38099" dir="2700000" algn="ctr" rotWithShape="0">
@@ -24784,7 +24870,7 @@
               </a14:hiddenEffects>
             </a:ext>
             <a:ext uri="{FAA26D3D-D897-4be2-8F04-BA451C77F1D7}">
-              <ma14:placeholderFlag xmlns:ma14="http://schemas.microsoft.com/office/mac/drawingml/2011/main" xmlns="" val="1"/>
+              <ma14:placeholderFlag xmlns:ma14="http://schemas.microsoft.com/office/mac/drawingml/2011/main" val="1"/>
             </a:ext>
           </a:extLst>
         </p:spPr>
@@ -24866,14 +24952,14 @@
           </a:ln>
           <a:effectLst/>
           <a:extLst>
-            <a:ext uri="{909E8E84-426E-40DD-AFC4-6F175D3DCCD1}">
+            <a:ext uri="{909E8E84-426E-40dd-AFC4-6F175D3DCCD1}">
               <a14:hiddenFill xmlns:a14="http://schemas.microsoft.com/office/drawing/2010/main">
                 <a:solidFill>
                   <a:srgbClr val="FFFFFF"/>
                 </a:solidFill>
               </a14:hiddenFill>
             </a:ext>
-            <a:ext uri="{91240B29-F687-4F45-9708-019B960494DF}">
+            <a:ext uri="{91240B29-F687-4f45-9708-019B960494DF}">
               <a14:hiddenLine xmlns:a14="http://schemas.microsoft.com/office/drawing/2010/main" w="12700">
                 <a:solidFill>
                   <a:schemeClr val="tx1"/>
@@ -24883,7 +24969,7 @@
                 <a:tailEnd/>
               </a14:hiddenLine>
             </a:ext>
-            <a:ext uri="{AF507438-7753-43E0-B8FC-AC1667EBCBE1}">
+            <a:ext uri="{AF507438-7753-43e0-B8FC-AC1667EBCBE1}">
               <a14:hiddenEffects xmlns:a14="http://schemas.microsoft.com/office/drawing/2010/main">
                 <a:effectLst>
                   <a:outerShdw blurRad="63500" dist="38099" dir="2700000" algn="ctr" rotWithShape="0">
@@ -24895,7 +24981,7 @@
               </a14:hiddenEffects>
             </a:ext>
             <a:ext uri="{FAA26D3D-D897-4be2-8F04-BA451C77F1D7}">
-              <ma14:placeholderFlag xmlns:ma14="http://schemas.microsoft.com/office/mac/drawingml/2011/main" xmlns="" val="1"/>
+              <ma14:placeholderFlag xmlns:ma14="http://schemas.microsoft.com/office/mac/drawingml/2011/main" val="1"/>
             </a:ext>
           </a:extLst>
         </p:spPr>
@@ -24933,7 +25019,7 @@
     <p:sldLayoutId id="2147483671" r:id="rId10"/>
     <p:sldLayoutId id="2147483672" r:id="rId11"/>
   </p:sldLayoutIdLst>
-  <p:transition/>
+  <p:transition xmlns:p14="http://schemas.microsoft.com/office/powerpoint/2010/main"/>
   <p:hf sldNum="0" hdr="0" dt="0"/>
   <p:txStyles>
     <p:titleStyle>
@@ -25386,7 +25472,7 @@
     <p:sldLayoutId id="2147483770" r:id="rId10"/>
     <p:sldLayoutId id="2147483771" r:id="rId11"/>
   </p:sldLayoutIdLst>
-  <p:transition/>
+  <p:transition xmlns:p14="http://schemas.microsoft.com/office/powerpoint/2010/main"/>
   <p:hf sldNum="0" hdr="0" dt="0"/>
   <p:txStyles>
     <p:titleStyle>
@@ -25901,14 +25987,14 @@
           </a:ln>
           <a:effectLst/>
           <a:extLst>
-            <a:ext uri="{909E8E84-426E-40DD-AFC4-6F175D3DCCD1}">
+            <a:ext uri="{909E8E84-426E-40dd-AFC4-6F175D3DCCD1}">
               <a14:hiddenFill xmlns:a14="http://schemas.microsoft.com/office/drawing/2010/main">
                 <a:solidFill>
                   <a:srgbClr val="FFFFFF"/>
                 </a:solidFill>
               </a14:hiddenFill>
             </a:ext>
-            <a:ext uri="{91240B29-F687-4F45-9708-019B960494DF}">
+            <a:ext uri="{91240B29-F687-4f45-9708-019B960494DF}">
               <a14:hiddenLine xmlns:a14="http://schemas.microsoft.com/office/drawing/2010/main" w="12700">
                 <a:solidFill>
                   <a:schemeClr val="tx1"/>
@@ -25918,7 +26004,7 @@
                 <a:tailEnd/>
               </a14:hiddenLine>
             </a:ext>
-            <a:ext uri="{AF507438-7753-43E0-B8FC-AC1667EBCBE1}">
+            <a:ext uri="{AF507438-7753-43e0-B8FC-AC1667EBCBE1}">
               <a14:hiddenEffects xmlns:a14="http://schemas.microsoft.com/office/drawing/2010/main">
                 <a:effectLst>
                   <a:outerShdw blurRad="63500" dist="38099" dir="2700000" algn="ctr" rotWithShape="0">
@@ -25930,7 +26016,7 @@
               </a14:hiddenEffects>
             </a:ext>
             <a:ext uri="{FAA26D3D-D897-4be2-8F04-BA451C77F1D7}">
-              <ma14:placeholderFlag xmlns:ma14="http://schemas.microsoft.com/office/mac/drawingml/2011/main" xmlns="" val="1"/>
+              <ma14:placeholderFlag xmlns:ma14="http://schemas.microsoft.com/office/mac/drawingml/2011/main" val="1"/>
             </a:ext>
           </a:extLst>
         </p:spPr>
@@ -25976,14 +26062,14 @@
           </a:ln>
           <a:effectLst/>
           <a:extLst>
-            <a:ext uri="{909E8E84-426E-40DD-AFC4-6F175D3DCCD1}">
+            <a:ext uri="{909E8E84-426E-40dd-AFC4-6F175D3DCCD1}">
               <a14:hiddenFill xmlns:a14="http://schemas.microsoft.com/office/drawing/2010/main">
                 <a:solidFill>
                   <a:srgbClr val="FFFFFF"/>
                 </a:solidFill>
               </a14:hiddenFill>
             </a:ext>
-            <a:ext uri="{91240B29-F687-4F45-9708-019B960494DF}">
+            <a:ext uri="{91240B29-F687-4f45-9708-019B960494DF}">
               <a14:hiddenLine xmlns:a14="http://schemas.microsoft.com/office/drawing/2010/main" w="12700">
                 <a:solidFill>
                   <a:schemeClr val="tx1"/>
@@ -25993,7 +26079,7 @@
                 <a:tailEnd/>
               </a14:hiddenLine>
             </a:ext>
-            <a:ext uri="{AF507438-7753-43E0-B8FC-AC1667EBCBE1}">
+            <a:ext uri="{AF507438-7753-43e0-B8FC-AC1667EBCBE1}">
               <a14:hiddenEffects xmlns:a14="http://schemas.microsoft.com/office/drawing/2010/main">
                 <a:effectLst>
                   <a:outerShdw blurRad="63500" dist="38099" dir="2700000" algn="ctr" rotWithShape="0">
@@ -26005,7 +26091,7 @@
               </a14:hiddenEffects>
             </a:ext>
             <a:ext uri="{FAA26D3D-D897-4be2-8F04-BA451C77F1D7}">
-              <ma14:placeholderFlag xmlns:ma14="http://schemas.microsoft.com/office/mac/drawingml/2011/main" xmlns="" val="1"/>
+              <ma14:placeholderFlag xmlns:ma14="http://schemas.microsoft.com/office/mac/drawingml/2011/main" val="1"/>
             </a:ext>
           </a:extLst>
         </p:spPr>
@@ -26079,7 +26165,7 @@
     <p:sldLayoutId id="2147483781" r:id="rId10"/>
     <p:sldLayoutId id="2147483782" r:id="rId11"/>
   </p:sldLayoutIdLst>
-  <p:transition/>
+  <p:transition xmlns:p14="http://schemas.microsoft.com/office/powerpoint/2010/main"/>
   <p:hf sldNum="0" hdr="0" dt="0"/>
   <p:txStyles>
     <p:titleStyle>
@@ -26594,14 +26680,14 @@
           </a:ln>
           <a:effectLst/>
           <a:extLst>
-            <a:ext uri="{909E8E84-426E-40DD-AFC4-6F175D3DCCD1}">
+            <a:ext uri="{909E8E84-426E-40dd-AFC4-6F175D3DCCD1}">
               <a14:hiddenFill xmlns:a14="http://schemas.microsoft.com/office/drawing/2010/main">
                 <a:solidFill>
                   <a:srgbClr val="FFFFFF"/>
                 </a:solidFill>
               </a14:hiddenFill>
             </a:ext>
-            <a:ext uri="{91240B29-F687-4F45-9708-019B960494DF}">
+            <a:ext uri="{91240B29-F687-4f45-9708-019B960494DF}">
               <a14:hiddenLine xmlns:a14="http://schemas.microsoft.com/office/drawing/2010/main" w="12700">
                 <a:solidFill>
                   <a:schemeClr val="tx1"/>
@@ -26611,7 +26697,7 @@
                 <a:tailEnd/>
               </a14:hiddenLine>
             </a:ext>
-            <a:ext uri="{AF507438-7753-43E0-B8FC-AC1667EBCBE1}">
+            <a:ext uri="{AF507438-7753-43e0-B8FC-AC1667EBCBE1}">
               <a14:hiddenEffects xmlns:a14="http://schemas.microsoft.com/office/drawing/2010/main">
                 <a:effectLst>
                   <a:outerShdw blurRad="63500" dist="38099" dir="2700000" algn="ctr" rotWithShape="0">
@@ -26623,7 +26709,7 @@
               </a14:hiddenEffects>
             </a:ext>
             <a:ext uri="{FAA26D3D-D897-4be2-8F04-BA451C77F1D7}">
-              <ma14:placeholderFlag xmlns:ma14="http://schemas.microsoft.com/office/mac/drawingml/2011/main" xmlns="" val="1"/>
+              <ma14:placeholderFlag xmlns:ma14="http://schemas.microsoft.com/office/mac/drawingml/2011/main" val="1"/>
             </a:ext>
           </a:extLst>
         </p:spPr>
@@ -26669,14 +26755,14 @@
           </a:ln>
           <a:effectLst/>
           <a:extLst>
-            <a:ext uri="{909E8E84-426E-40DD-AFC4-6F175D3DCCD1}">
+            <a:ext uri="{909E8E84-426E-40dd-AFC4-6F175D3DCCD1}">
               <a14:hiddenFill xmlns:a14="http://schemas.microsoft.com/office/drawing/2010/main">
                 <a:solidFill>
                   <a:srgbClr val="FFFFFF"/>
                 </a:solidFill>
               </a14:hiddenFill>
             </a:ext>
-            <a:ext uri="{91240B29-F687-4F45-9708-019B960494DF}">
+            <a:ext uri="{91240B29-F687-4f45-9708-019B960494DF}">
               <a14:hiddenLine xmlns:a14="http://schemas.microsoft.com/office/drawing/2010/main" w="12700">
                 <a:solidFill>
                   <a:schemeClr val="tx1"/>
@@ -26686,7 +26772,7 @@
                 <a:tailEnd/>
               </a14:hiddenLine>
             </a:ext>
-            <a:ext uri="{AF507438-7753-43E0-B8FC-AC1667EBCBE1}">
+            <a:ext uri="{AF507438-7753-43e0-B8FC-AC1667EBCBE1}">
               <a14:hiddenEffects xmlns:a14="http://schemas.microsoft.com/office/drawing/2010/main">
                 <a:effectLst>
                   <a:outerShdw blurRad="63500" dist="38099" dir="2700000" algn="ctr" rotWithShape="0">
@@ -26698,7 +26784,7 @@
               </a14:hiddenEffects>
             </a:ext>
             <a:ext uri="{FAA26D3D-D897-4be2-8F04-BA451C77F1D7}">
-              <ma14:placeholderFlag xmlns:ma14="http://schemas.microsoft.com/office/mac/drawingml/2011/main" xmlns="" val="1"/>
+              <ma14:placeholderFlag xmlns:ma14="http://schemas.microsoft.com/office/mac/drawingml/2011/main" val="1"/>
             </a:ext>
           </a:extLst>
         </p:spPr>
@@ -26772,7 +26858,7 @@
     <p:sldLayoutId id="2147483792" r:id="rId10"/>
     <p:sldLayoutId id="2147483793" r:id="rId11"/>
   </p:sldLayoutIdLst>
-  <p:transition/>
+  <p:transition xmlns:p14="http://schemas.microsoft.com/office/powerpoint/2010/main"/>
   <p:hf sldNum="0" hdr="0" dt="0"/>
   <p:txStyles>
     <p:titleStyle>
@@ -27287,14 +27373,14 @@
           </a:ln>
           <a:effectLst/>
           <a:extLst>
-            <a:ext uri="{909E8E84-426E-40DD-AFC4-6F175D3DCCD1}">
+            <a:ext uri="{909E8E84-426E-40dd-AFC4-6F175D3DCCD1}">
               <a14:hiddenFill xmlns:a14="http://schemas.microsoft.com/office/drawing/2010/main">
                 <a:solidFill>
                   <a:srgbClr val="FFFFFF"/>
                 </a:solidFill>
               </a14:hiddenFill>
             </a:ext>
-            <a:ext uri="{91240B29-F687-4F45-9708-019B960494DF}">
+            <a:ext uri="{91240B29-F687-4f45-9708-019B960494DF}">
               <a14:hiddenLine xmlns:a14="http://schemas.microsoft.com/office/drawing/2010/main" w="12700">
                 <a:solidFill>
                   <a:schemeClr val="tx1"/>
@@ -27304,7 +27390,7 @@
                 <a:tailEnd/>
               </a14:hiddenLine>
             </a:ext>
-            <a:ext uri="{AF507438-7753-43E0-B8FC-AC1667EBCBE1}">
+            <a:ext uri="{AF507438-7753-43e0-B8FC-AC1667EBCBE1}">
               <a14:hiddenEffects xmlns:a14="http://schemas.microsoft.com/office/drawing/2010/main">
                 <a:effectLst>
                   <a:outerShdw blurRad="63500" dist="38099" dir="2700000" algn="ctr" rotWithShape="0">
@@ -27316,7 +27402,7 @@
               </a14:hiddenEffects>
             </a:ext>
             <a:ext uri="{FAA26D3D-D897-4be2-8F04-BA451C77F1D7}">
-              <ma14:placeholderFlag xmlns:ma14="http://schemas.microsoft.com/office/mac/drawingml/2011/main" xmlns="" val="1"/>
+              <ma14:placeholderFlag xmlns:ma14="http://schemas.microsoft.com/office/mac/drawingml/2011/main" val="1"/>
             </a:ext>
           </a:extLst>
         </p:spPr>
@@ -27362,14 +27448,14 @@
           </a:ln>
           <a:effectLst/>
           <a:extLst>
-            <a:ext uri="{909E8E84-426E-40DD-AFC4-6F175D3DCCD1}">
+            <a:ext uri="{909E8E84-426E-40dd-AFC4-6F175D3DCCD1}">
               <a14:hiddenFill xmlns:a14="http://schemas.microsoft.com/office/drawing/2010/main">
                 <a:solidFill>
                   <a:srgbClr val="FFFFFF"/>
                 </a:solidFill>
               </a14:hiddenFill>
             </a:ext>
-            <a:ext uri="{91240B29-F687-4F45-9708-019B960494DF}">
+            <a:ext uri="{91240B29-F687-4f45-9708-019B960494DF}">
               <a14:hiddenLine xmlns:a14="http://schemas.microsoft.com/office/drawing/2010/main" w="12700">
                 <a:solidFill>
                   <a:schemeClr val="tx1"/>
@@ -27379,7 +27465,7 @@
                 <a:tailEnd/>
               </a14:hiddenLine>
             </a:ext>
-            <a:ext uri="{AF507438-7753-43E0-B8FC-AC1667EBCBE1}">
+            <a:ext uri="{AF507438-7753-43e0-B8FC-AC1667EBCBE1}">
               <a14:hiddenEffects xmlns:a14="http://schemas.microsoft.com/office/drawing/2010/main">
                 <a:effectLst>
                   <a:outerShdw blurRad="63500" dist="38099" dir="2700000" algn="ctr" rotWithShape="0">
@@ -27391,7 +27477,7 @@
               </a14:hiddenEffects>
             </a:ext>
             <a:ext uri="{FAA26D3D-D897-4be2-8F04-BA451C77F1D7}">
-              <ma14:placeholderFlag xmlns:ma14="http://schemas.microsoft.com/office/mac/drawingml/2011/main" xmlns="" val="1"/>
+              <ma14:placeholderFlag xmlns:ma14="http://schemas.microsoft.com/office/mac/drawingml/2011/main" val="1"/>
             </a:ext>
           </a:extLst>
         </p:spPr>
@@ -27465,7 +27551,7 @@
     <p:sldLayoutId id="2147483803" r:id="rId10"/>
     <p:sldLayoutId id="2147483804" r:id="rId11"/>
   </p:sldLayoutIdLst>
-  <p:transition/>
+  <p:transition xmlns:p14="http://schemas.microsoft.com/office/powerpoint/2010/main"/>
   <p:hf sldNum="0" hdr="0" dt="0"/>
   <p:txStyles>
     <p:titleStyle>
@@ -27980,14 +28066,14 @@
           </a:ln>
           <a:effectLst/>
           <a:extLst>
-            <a:ext uri="{909E8E84-426E-40DD-AFC4-6F175D3DCCD1}">
+            <a:ext uri="{909E8E84-426E-40dd-AFC4-6F175D3DCCD1}">
               <a14:hiddenFill xmlns:a14="http://schemas.microsoft.com/office/drawing/2010/main">
                 <a:solidFill>
                   <a:srgbClr val="FFFFFF"/>
                 </a:solidFill>
               </a14:hiddenFill>
             </a:ext>
-            <a:ext uri="{91240B29-F687-4F45-9708-019B960494DF}">
+            <a:ext uri="{91240B29-F687-4f45-9708-019B960494DF}">
               <a14:hiddenLine xmlns:a14="http://schemas.microsoft.com/office/drawing/2010/main" w="12700">
                 <a:solidFill>
                   <a:schemeClr val="tx1"/>
@@ -27997,7 +28083,7 @@
                 <a:tailEnd/>
               </a14:hiddenLine>
             </a:ext>
-            <a:ext uri="{AF507438-7753-43E0-B8FC-AC1667EBCBE1}">
+            <a:ext uri="{AF507438-7753-43e0-B8FC-AC1667EBCBE1}">
               <a14:hiddenEffects xmlns:a14="http://schemas.microsoft.com/office/drawing/2010/main">
                 <a:effectLst>
                   <a:outerShdw blurRad="63500" dist="38099" dir="2700000" algn="ctr" rotWithShape="0">
@@ -28009,7 +28095,7 @@
               </a14:hiddenEffects>
             </a:ext>
             <a:ext uri="{FAA26D3D-D897-4be2-8F04-BA451C77F1D7}">
-              <ma14:placeholderFlag xmlns:ma14="http://schemas.microsoft.com/office/mac/drawingml/2011/main" xmlns="" val="1"/>
+              <ma14:placeholderFlag xmlns:ma14="http://schemas.microsoft.com/office/mac/drawingml/2011/main" val="1"/>
             </a:ext>
           </a:extLst>
         </p:spPr>
@@ -28055,14 +28141,14 @@
           </a:ln>
           <a:effectLst/>
           <a:extLst>
-            <a:ext uri="{909E8E84-426E-40DD-AFC4-6F175D3DCCD1}">
+            <a:ext uri="{909E8E84-426E-40dd-AFC4-6F175D3DCCD1}">
               <a14:hiddenFill xmlns:a14="http://schemas.microsoft.com/office/drawing/2010/main">
                 <a:solidFill>
                   <a:srgbClr val="FFFFFF"/>
                 </a:solidFill>
               </a14:hiddenFill>
             </a:ext>
-            <a:ext uri="{91240B29-F687-4F45-9708-019B960494DF}">
+            <a:ext uri="{91240B29-F687-4f45-9708-019B960494DF}">
               <a14:hiddenLine xmlns:a14="http://schemas.microsoft.com/office/drawing/2010/main" w="12700">
                 <a:solidFill>
                   <a:schemeClr val="tx1"/>
@@ -28072,7 +28158,7 @@
                 <a:tailEnd/>
               </a14:hiddenLine>
             </a:ext>
-            <a:ext uri="{AF507438-7753-43E0-B8FC-AC1667EBCBE1}">
+            <a:ext uri="{AF507438-7753-43e0-B8FC-AC1667EBCBE1}">
               <a14:hiddenEffects xmlns:a14="http://schemas.microsoft.com/office/drawing/2010/main">
                 <a:effectLst>
                   <a:outerShdw blurRad="63500" dist="38099" dir="2700000" algn="ctr" rotWithShape="0">
@@ -28084,7 +28170,7 @@
               </a14:hiddenEffects>
             </a:ext>
             <a:ext uri="{FAA26D3D-D897-4be2-8F04-BA451C77F1D7}">
-              <ma14:placeholderFlag xmlns:ma14="http://schemas.microsoft.com/office/mac/drawingml/2011/main" xmlns="" val="1"/>
+              <ma14:placeholderFlag xmlns:ma14="http://schemas.microsoft.com/office/mac/drawingml/2011/main" val="1"/>
             </a:ext>
           </a:extLst>
         </p:spPr>
@@ -28158,7 +28244,7 @@
     <p:sldLayoutId id="2147483814" r:id="rId10"/>
     <p:sldLayoutId id="2147483815" r:id="rId11"/>
   </p:sldLayoutIdLst>
-  <p:transition/>
+  <p:transition xmlns:p14="http://schemas.microsoft.com/office/powerpoint/2010/main"/>
   <p:hf sldNum="0" hdr="0" dt="0"/>
   <p:txStyles>
     <p:titleStyle>
@@ -28673,14 +28759,14 @@
           </a:ln>
           <a:effectLst/>
           <a:extLst>
-            <a:ext uri="{909E8E84-426E-40DD-AFC4-6F175D3DCCD1}">
+            <a:ext uri="{909E8E84-426E-40dd-AFC4-6F175D3DCCD1}">
               <a14:hiddenFill xmlns:a14="http://schemas.microsoft.com/office/drawing/2010/main">
                 <a:solidFill>
                   <a:srgbClr val="FFFFFF"/>
                 </a:solidFill>
               </a14:hiddenFill>
             </a:ext>
-            <a:ext uri="{91240B29-F687-4F45-9708-019B960494DF}">
+            <a:ext uri="{91240B29-F687-4f45-9708-019B960494DF}">
               <a14:hiddenLine xmlns:a14="http://schemas.microsoft.com/office/drawing/2010/main" w="12700">
                 <a:solidFill>
                   <a:schemeClr val="tx1"/>
@@ -28690,7 +28776,7 @@
                 <a:tailEnd/>
               </a14:hiddenLine>
             </a:ext>
-            <a:ext uri="{AF507438-7753-43E0-B8FC-AC1667EBCBE1}">
+            <a:ext uri="{AF507438-7753-43e0-B8FC-AC1667EBCBE1}">
               <a14:hiddenEffects xmlns:a14="http://schemas.microsoft.com/office/drawing/2010/main">
                 <a:effectLst>
                   <a:outerShdw blurRad="63500" dist="38099" dir="2700000" algn="ctr" rotWithShape="0">
@@ -28702,7 +28788,7 @@
               </a14:hiddenEffects>
             </a:ext>
             <a:ext uri="{FAA26D3D-D897-4be2-8F04-BA451C77F1D7}">
-              <ma14:placeholderFlag xmlns:ma14="http://schemas.microsoft.com/office/mac/drawingml/2011/main" xmlns="" val="1"/>
+              <ma14:placeholderFlag xmlns:ma14="http://schemas.microsoft.com/office/mac/drawingml/2011/main" val="1"/>
             </a:ext>
           </a:extLst>
         </p:spPr>
@@ -28748,14 +28834,14 @@
           </a:ln>
           <a:effectLst/>
           <a:extLst>
-            <a:ext uri="{909E8E84-426E-40DD-AFC4-6F175D3DCCD1}">
+            <a:ext uri="{909E8E84-426E-40dd-AFC4-6F175D3DCCD1}">
               <a14:hiddenFill xmlns:a14="http://schemas.microsoft.com/office/drawing/2010/main">
                 <a:solidFill>
                   <a:srgbClr val="FFFFFF"/>
                 </a:solidFill>
               </a14:hiddenFill>
             </a:ext>
-            <a:ext uri="{91240B29-F687-4F45-9708-019B960494DF}">
+            <a:ext uri="{91240B29-F687-4f45-9708-019B960494DF}">
               <a14:hiddenLine xmlns:a14="http://schemas.microsoft.com/office/drawing/2010/main" w="12700">
                 <a:solidFill>
                   <a:schemeClr val="tx1"/>
@@ -28765,7 +28851,7 @@
                 <a:tailEnd/>
               </a14:hiddenLine>
             </a:ext>
-            <a:ext uri="{AF507438-7753-43E0-B8FC-AC1667EBCBE1}">
+            <a:ext uri="{AF507438-7753-43e0-B8FC-AC1667EBCBE1}">
               <a14:hiddenEffects xmlns:a14="http://schemas.microsoft.com/office/drawing/2010/main">
                 <a:effectLst>
                   <a:outerShdw blurRad="63500" dist="38099" dir="2700000" algn="ctr" rotWithShape="0">
@@ -28777,7 +28863,7 @@
               </a14:hiddenEffects>
             </a:ext>
             <a:ext uri="{FAA26D3D-D897-4be2-8F04-BA451C77F1D7}">
-              <ma14:placeholderFlag xmlns:ma14="http://schemas.microsoft.com/office/mac/drawingml/2011/main" xmlns="" val="1"/>
+              <ma14:placeholderFlag xmlns:ma14="http://schemas.microsoft.com/office/mac/drawingml/2011/main" val="1"/>
             </a:ext>
           </a:extLst>
         </p:spPr>
@@ -28851,7 +28937,7 @@
     <p:sldLayoutId id="2147483682" r:id="rId10"/>
     <p:sldLayoutId id="2147483683" r:id="rId11"/>
   </p:sldLayoutIdLst>
-  <p:transition/>
+  <p:transition xmlns:p14="http://schemas.microsoft.com/office/powerpoint/2010/main"/>
   <p:hf sldNum="0" hdr="0" dt="0"/>
   <p:txStyles>
     <p:titleStyle>
@@ -29366,14 +29452,14 @@
           </a:ln>
           <a:effectLst/>
           <a:extLst>
-            <a:ext uri="{909E8E84-426E-40DD-AFC4-6F175D3DCCD1}">
+            <a:ext uri="{909E8E84-426E-40dd-AFC4-6F175D3DCCD1}">
               <a14:hiddenFill xmlns:a14="http://schemas.microsoft.com/office/drawing/2010/main">
                 <a:solidFill>
                   <a:srgbClr val="FFFFFF"/>
                 </a:solidFill>
               </a14:hiddenFill>
             </a:ext>
-            <a:ext uri="{91240B29-F687-4F45-9708-019B960494DF}">
+            <a:ext uri="{91240B29-F687-4f45-9708-019B960494DF}">
               <a14:hiddenLine xmlns:a14="http://schemas.microsoft.com/office/drawing/2010/main" w="12700">
                 <a:solidFill>
                   <a:schemeClr val="tx1"/>
@@ -29383,7 +29469,7 @@
                 <a:tailEnd/>
               </a14:hiddenLine>
             </a:ext>
-            <a:ext uri="{AF507438-7753-43E0-B8FC-AC1667EBCBE1}">
+            <a:ext uri="{AF507438-7753-43e0-B8FC-AC1667EBCBE1}">
               <a14:hiddenEffects xmlns:a14="http://schemas.microsoft.com/office/drawing/2010/main">
                 <a:effectLst>
                   <a:outerShdw blurRad="63500" dist="38099" dir="2700000" algn="ctr" rotWithShape="0">
@@ -29395,7 +29481,7 @@
               </a14:hiddenEffects>
             </a:ext>
             <a:ext uri="{FAA26D3D-D897-4be2-8F04-BA451C77F1D7}">
-              <ma14:placeholderFlag xmlns:ma14="http://schemas.microsoft.com/office/mac/drawingml/2011/main" xmlns="" val="1"/>
+              <ma14:placeholderFlag xmlns:ma14="http://schemas.microsoft.com/office/mac/drawingml/2011/main" val="1"/>
             </a:ext>
           </a:extLst>
         </p:spPr>
@@ -29433,7 +29519,7 @@
     <p:sldLayoutId id="2147483693" r:id="rId10"/>
     <p:sldLayoutId id="2147483694" r:id="rId11"/>
   </p:sldLayoutIdLst>
-  <p:transition/>
+  <p:transition xmlns:p14="http://schemas.microsoft.com/office/powerpoint/2010/main"/>
   <p:hf sldNum="0" hdr="0" dt="0"/>
   <p:txStyles>
     <p:titleStyle>
@@ -29894,14 +29980,14 @@
           </a:ln>
           <a:effectLst/>
           <a:extLst>
-            <a:ext uri="{909E8E84-426E-40DD-AFC4-6F175D3DCCD1}">
+            <a:ext uri="{909E8E84-426E-40dd-AFC4-6F175D3DCCD1}">
               <a14:hiddenFill xmlns:a14="http://schemas.microsoft.com/office/drawing/2010/main">
                 <a:solidFill>
                   <a:srgbClr val="FFFFFF"/>
                 </a:solidFill>
               </a14:hiddenFill>
             </a:ext>
-            <a:ext uri="{91240B29-F687-4F45-9708-019B960494DF}">
+            <a:ext uri="{91240B29-F687-4f45-9708-019B960494DF}">
               <a14:hiddenLine xmlns:a14="http://schemas.microsoft.com/office/drawing/2010/main" w="12700">
                 <a:solidFill>
                   <a:schemeClr val="tx1"/>
@@ -29911,7 +29997,7 @@
                 <a:tailEnd/>
               </a14:hiddenLine>
             </a:ext>
-            <a:ext uri="{AF507438-7753-43E0-B8FC-AC1667EBCBE1}">
+            <a:ext uri="{AF507438-7753-43e0-B8FC-AC1667EBCBE1}">
               <a14:hiddenEffects xmlns:a14="http://schemas.microsoft.com/office/drawing/2010/main">
                 <a:effectLst>
                   <a:outerShdw blurRad="63500" dist="38099" dir="2700000" algn="ctr" rotWithShape="0">
@@ -29923,7 +30009,7 @@
               </a14:hiddenEffects>
             </a:ext>
             <a:ext uri="{FAA26D3D-D897-4be2-8F04-BA451C77F1D7}">
-              <ma14:placeholderFlag xmlns:ma14="http://schemas.microsoft.com/office/mac/drawingml/2011/main" xmlns="" val="1"/>
+              <ma14:placeholderFlag xmlns:ma14="http://schemas.microsoft.com/office/mac/drawingml/2011/main" val="1"/>
             </a:ext>
           </a:extLst>
         </p:spPr>
@@ -29997,7 +30083,7 @@
     <p:sldLayoutId id="2147483704" r:id="rId10"/>
     <p:sldLayoutId id="2147483705" r:id="rId11"/>
   </p:sldLayoutIdLst>
-  <p:transition/>
+  <p:transition xmlns:p14="http://schemas.microsoft.com/office/powerpoint/2010/main"/>
   <p:hf sldNum="0" hdr="0" dt="0"/>
   <p:txStyles>
     <p:titleStyle>
@@ -30512,14 +30598,14 @@
           </a:ln>
           <a:effectLst/>
           <a:extLst>
-            <a:ext uri="{909E8E84-426E-40DD-AFC4-6F175D3DCCD1}">
+            <a:ext uri="{909E8E84-426E-40dd-AFC4-6F175D3DCCD1}">
               <a14:hiddenFill xmlns:a14="http://schemas.microsoft.com/office/drawing/2010/main">
                 <a:solidFill>
                   <a:srgbClr val="FFFFFF"/>
                 </a:solidFill>
               </a14:hiddenFill>
             </a:ext>
-            <a:ext uri="{91240B29-F687-4F45-9708-019B960494DF}">
+            <a:ext uri="{91240B29-F687-4f45-9708-019B960494DF}">
               <a14:hiddenLine xmlns:a14="http://schemas.microsoft.com/office/drawing/2010/main" w="12700">
                 <a:solidFill>
                   <a:schemeClr val="tx1"/>
@@ -30529,7 +30615,7 @@
                 <a:tailEnd/>
               </a14:hiddenLine>
             </a:ext>
-            <a:ext uri="{AF507438-7753-43E0-B8FC-AC1667EBCBE1}">
+            <a:ext uri="{AF507438-7753-43e0-B8FC-AC1667EBCBE1}">
               <a14:hiddenEffects xmlns:a14="http://schemas.microsoft.com/office/drawing/2010/main">
                 <a:effectLst>
                   <a:outerShdw blurRad="63500" dist="38099" dir="2700000" algn="ctr" rotWithShape="0">
@@ -30541,7 +30627,7 @@
               </a14:hiddenEffects>
             </a:ext>
             <a:ext uri="{FAA26D3D-D897-4be2-8F04-BA451C77F1D7}">
-              <ma14:placeholderFlag xmlns:ma14="http://schemas.microsoft.com/office/mac/drawingml/2011/main" xmlns="" val="1"/>
+              <ma14:placeholderFlag xmlns:ma14="http://schemas.microsoft.com/office/mac/drawingml/2011/main" val="1"/>
             </a:ext>
           </a:extLst>
         </p:spPr>
@@ -30579,7 +30665,7 @@
     <p:sldLayoutId id="2147483715" r:id="rId10"/>
     <p:sldLayoutId id="2147483716" r:id="rId11"/>
   </p:sldLayoutIdLst>
-  <p:transition/>
+  <p:transition xmlns:p14="http://schemas.microsoft.com/office/powerpoint/2010/main"/>
   <p:hf sldNum="0" hdr="0" dt="0"/>
   <p:txStyles>
     <p:titleStyle>
@@ -31040,14 +31126,14 @@
           </a:ln>
           <a:effectLst/>
           <a:extLst>
-            <a:ext uri="{909E8E84-426E-40DD-AFC4-6F175D3DCCD1}">
+            <a:ext uri="{909E8E84-426E-40dd-AFC4-6F175D3DCCD1}">
               <a14:hiddenFill xmlns:a14="http://schemas.microsoft.com/office/drawing/2010/main">
                 <a:solidFill>
                   <a:srgbClr val="FFFFFF"/>
                 </a:solidFill>
               </a14:hiddenFill>
             </a:ext>
-            <a:ext uri="{91240B29-F687-4F45-9708-019B960494DF}">
+            <a:ext uri="{91240B29-F687-4f45-9708-019B960494DF}">
               <a14:hiddenLine xmlns:a14="http://schemas.microsoft.com/office/drawing/2010/main" w="12700">
                 <a:solidFill>
                   <a:schemeClr val="tx1"/>
@@ -31057,7 +31143,7 @@
                 <a:tailEnd/>
               </a14:hiddenLine>
             </a:ext>
-            <a:ext uri="{AF507438-7753-43E0-B8FC-AC1667EBCBE1}">
+            <a:ext uri="{AF507438-7753-43e0-B8FC-AC1667EBCBE1}">
               <a14:hiddenEffects xmlns:a14="http://schemas.microsoft.com/office/drawing/2010/main">
                 <a:effectLst>
                   <a:outerShdw blurRad="63500" dist="38099" dir="2700000" algn="ctr" rotWithShape="0">
@@ -31069,7 +31155,7 @@
               </a14:hiddenEffects>
             </a:ext>
             <a:ext uri="{FAA26D3D-D897-4be2-8F04-BA451C77F1D7}">
-              <ma14:placeholderFlag xmlns:ma14="http://schemas.microsoft.com/office/mac/drawingml/2011/main" xmlns="" val="1"/>
+              <ma14:placeholderFlag xmlns:ma14="http://schemas.microsoft.com/office/mac/drawingml/2011/main" val="1"/>
             </a:ext>
           </a:extLst>
         </p:spPr>
@@ -31107,7 +31193,7 @@
     <p:sldLayoutId id="2147483726" r:id="rId10"/>
     <p:sldLayoutId id="2147483727" r:id="rId11"/>
   </p:sldLayoutIdLst>
-  <p:transition/>
+  <p:transition xmlns:p14="http://schemas.microsoft.com/office/powerpoint/2010/main"/>
   <p:hf sldNum="0" hdr="0" dt="0"/>
   <p:txStyles>
     <p:titleStyle>
@@ -31568,14 +31654,14 @@
           </a:ln>
           <a:effectLst/>
           <a:extLst>
-            <a:ext uri="{909E8E84-426E-40DD-AFC4-6F175D3DCCD1}">
+            <a:ext uri="{909E8E84-426E-40dd-AFC4-6F175D3DCCD1}">
               <a14:hiddenFill xmlns:a14="http://schemas.microsoft.com/office/drawing/2010/main">
                 <a:solidFill>
                   <a:srgbClr val="FFFFFF"/>
                 </a:solidFill>
               </a14:hiddenFill>
             </a:ext>
-            <a:ext uri="{91240B29-F687-4F45-9708-019B960494DF}">
+            <a:ext uri="{91240B29-F687-4f45-9708-019B960494DF}">
               <a14:hiddenLine xmlns:a14="http://schemas.microsoft.com/office/drawing/2010/main" w="12700">
                 <a:solidFill>
                   <a:schemeClr val="tx1"/>
@@ -31585,7 +31671,7 @@
                 <a:tailEnd/>
               </a14:hiddenLine>
             </a:ext>
-            <a:ext uri="{AF507438-7753-43E0-B8FC-AC1667EBCBE1}">
+            <a:ext uri="{AF507438-7753-43e0-B8FC-AC1667EBCBE1}">
               <a14:hiddenEffects xmlns:a14="http://schemas.microsoft.com/office/drawing/2010/main">
                 <a:effectLst>
                   <a:outerShdw blurRad="63500" dist="38099" dir="2700000" algn="ctr" rotWithShape="0">
@@ -31597,7 +31683,7 @@
               </a14:hiddenEffects>
             </a:ext>
             <a:ext uri="{FAA26D3D-D897-4be2-8F04-BA451C77F1D7}">
-              <ma14:placeholderFlag xmlns:ma14="http://schemas.microsoft.com/office/mac/drawingml/2011/main" xmlns="" val="1"/>
+              <ma14:placeholderFlag xmlns:ma14="http://schemas.microsoft.com/office/mac/drawingml/2011/main" val="1"/>
             </a:ext>
           </a:extLst>
         </p:spPr>
@@ -31679,14 +31765,14 @@
           </a:ln>
           <a:effectLst/>
           <a:extLst>
-            <a:ext uri="{909E8E84-426E-40DD-AFC4-6F175D3DCCD1}">
+            <a:ext uri="{909E8E84-426E-40dd-AFC4-6F175D3DCCD1}">
               <a14:hiddenFill xmlns:a14="http://schemas.microsoft.com/office/drawing/2010/main">
                 <a:solidFill>
                   <a:srgbClr val="FFFFFF"/>
                 </a:solidFill>
               </a14:hiddenFill>
             </a:ext>
-            <a:ext uri="{91240B29-F687-4F45-9708-019B960494DF}">
+            <a:ext uri="{91240B29-F687-4f45-9708-019B960494DF}">
               <a14:hiddenLine xmlns:a14="http://schemas.microsoft.com/office/drawing/2010/main" w="12700">
                 <a:solidFill>
                   <a:schemeClr val="tx1"/>
@@ -31696,7 +31782,7 @@
                 <a:tailEnd/>
               </a14:hiddenLine>
             </a:ext>
-            <a:ext uri="{AF507438-7753-43E0-B8FC-AC1667EBCBE1}">
+            <a:ext uri="{AF507438-7753-43e0-B8FC-AC1667EBCBE1}">
               <a14:hiddenEffects xmlns:a14="http://schemas.microsoft.com/office/drawing/2010/main">
                 <a:effectLst>
                   <a:outerShdw blurRad="63500" dist="38099" dir="2700000" algn="ctr" rotWithShape="0">
@@ -31708,7 +31794,7 @@
               </a14:hiddenEffects>
             </a:ext>
             <a:ext uri="{FAA26D3D-D897-4be2-8F04-BA451C77F1D7}">
-              <ma14:placeholderFlag xmlns:ma14="http://schemas.microsoft.com/office/mac/drawingml/2011/main" xmlns="" val="1"/>
+              <ma14:placeholderFlag xmlns:ma14="http://schemas.microsoft.com/office/mac/drawingml/2011/main" val="1"/>
             </a:ext>
           </a:extLst>
         </p:spPr>
@@ -31746,7 +31832,7 @@
     <p:sldLayoutId id="2147483737" r:id="rId10"/>
     <p:sldLayoutId id="2147483738" r:id="rId11"/>
   </p:sldLayoutIdLst>
-  <p:transition/>
+  <p:transition xmlns:p14="http://schemas.microsoft.com/office/powerpoint/2010/main"/>
   <p:hf sldNum="0" hdr="0" dt="0"/>
   <p:txStyles>
     <p:titleStyle>
@@ -32207,14 +32293,14 @@
           </a:ln>
           <a:effectLst/>
           <a:extLst>
-            <a:ext uri="{909E8E84-426E-40DD-AFC4-6F175D3DCCD1}">
+            <a:ext uri="{909E8E84-426E-40dd-AFC4-6F175D3DCCD1}">
               <a14:hiddenFill xmlns:a14="http://schemas.microsoft.com/office/drawing/2010/main">
                 <a:solidFill>
                   <a:srgbClr val="FFFFFF"/>
                 </a:solidFill>
               </a14:hiddenFill>
             </a:ext>
-            <a:ext uri="{91240B29-F687-4F45-9708-019B960494DF}">
+            <a:ext uri="{91240B29-F687-4f45-9708-019B960494DF}">
               <a14:hiddenLine xmlns:a14="http://schemas.microsoft.com/office/drawing/2010/main" w="12700">
                 <a:solidFill>
                   <a:schemeClr val="tx1"/>
@@ -32224,7 +32310,7 @@
                 <a:tailEnd/>
               </a14:hiddenLine>
             </a:ext>
-            <a:ext uri="{AF507438-7753-43E0-B8FC-AC1667EBCBE1}">
+            <a:ext uri="{AF507438-7753-43e0-B8FC-AC1667EBCBE1}">
               <a14:hiddenEffects xmlns:a14="http://schemas.microsoft.com/office/drawing/2010/main">
                 <a:effectLst>
                   <a:outerShdw blurRad="63500" dist="38099" dir="2700000" algn="ctr" rotWithShape="0">
@@ -32236,7 +32322,7 @@
               </a14:hiddenEffects>
             </a:ext>
             <a:ext uri="{FAA26D3D-D897-4be2-8F04-BA451C77F1D7}">
-              <ma14:placeholderFlag xmlns:ma14="http://schemas.microsoft.com/office/mac/drawingml/2011/main" xmlns="" val="1"/>
+              <ma14:placeholderFlag xmlns:ma14="http://schemas.microsoft.com/office/mac/drawingml/2011/main" val="1"/>
             </a:ext>
           </a:extLst>
         </p:spPr>
@@ -32318,14 +32404,14 @@
           </a:ln>
           <a:effectLst/>
           <a:extLst>
-            <a:ext uri="{909E8E84-426E-40DD-AFC4-6F175D3DCCD1}">
+            <a:ext uri="{909E8E84-426E-40dd-AFC4-6F175D3DCCD1}">
               <a14:hiddenFill xmlns:a14="http://schemas.microsoft.com/office/drawing/2010/main">
                 <a:solidFill>
                   <a:srgbClr val="FFFFFF"/>
                 </a:solidFill>
               </a14:hiddenFill>
             </a:ext>
-            <a:ext uri="{91240B29-F687-4F45-9708-019B960494DF}">
+            <a:ext uri="{91240B29-F687-4f45-9708-019B960494DF}">
               <a14:hiddenLine xmlns:a14="http://schemas.microsoft.com/office/drawing/2010/main" w="12700">
                 <a:solidFill>
                   <a:schemeClr val="tx1"/>
@@ -32335,7 +32421,7 @@
                 <a:tailEnd/>
               </a14:hiddenLine>
             </a:ext>
-            <a:ext uri="{AF507438-7753-43E0-B8FC-AC1667EBCBE1}">
+            <a:ext uri="{AF507438-7753-43e0-B8FC-AC1667EBCBE1}">
               <a14:hiddenEffects xmlns:a14="http://schemas.microsoft.com/office/drawing/2010/main">
                 <a:effectLst>
                   <a:outerShdw blurRad="63500" dist="38099" dir="2700000" algn="ctr" rotWithShape="0">
@@ -32347,7 +32433,7 @@
               </a14:hiddenEffects>
             </a:ext>
             <a:ext uri="{FAA26D3D-D897-4be2-8F04-BA451C77F1D7}">
-              <ma14:placeholderFlag xmlns:ma14="http://schemas.microsoft.com/office/mac/drawingml/2011/main" xmlns="" val="1"/>
+              <ma14:placeholderFlag xmlns:ma14="http://schemas.microsoft.com/office/mac/drawingml/2011/main" val="1"/>
             </a:ext>
           </a:extLst>
         </p:spPr>
@@ -32385,7 +32471,7 @@
     <p:sldLayoutId id="2147483748" r:id="rId10"/>
     <p:sldLayoutId id="2147483749" r:id="rId11"/>
   </p:sldLayoutIdLst>
-  <p:transition/>
+  <p:transition xmlns:p14="http://schemas.microsoft.com/office/powerpoint/2010/main"/>
   <p:hf sldNum="0" hdr="0" dt="0"/>
   <p:txStyles>
     <p:titleStyle>
@@ -32846,14 +32932,14 @@
           </a:ln>
           <a:effectLst/>
           <a:extLst>
-            <a:ext uri="{909E8E84-426E-40DD-AFC4-6F175D3DCCD1}">
+            <a:ext uri="{909E8E84-426E-40dd-AFC4-6F175D3DCCD1}">
               <a14:hiddenFill xmlns:a14="http://schemas.microsoft.com/office/drawing/2010/main">
                 <a:solidFill>
                   <a:srgbClr val="FFFFFF"/>
                 </a:solidFill>
               </a14:hiddenFill>
             </a:ext>
-            <a:ext uri="{91240B29-F687-4F45-9708-019B960494DF}">
+            <a:ext uri="{91240B29-F687-4f45-9708-019B960494DF}">
               <a14:hiddenLine xmlns:a14="http://schemas.microsoft.com/office/drawing/2010/main" w="12700">
                 <a:solidFill>
                   <a:schemeClr val="tx1"/>
@@ -32863,7 +32949,7 @@
                 <a:tailEnd/>
               </a14:hiddenLine>
             </a:ext>
-            <a:ext uri="{AF507438-7753-43E0-B8FC-AC1667EBCBE1}">
+            <a:ext uri="{AF507438-7753-43e0-B8FC-AC1667EBCBE1}">
               <a14:hiddenEffects xmlns:a14="http://schemas.microsoft.com/office/drawing/2010/main">
                 <a:effectLst>
                   <a:outerShdw blurRad="63500" dist="38099" dir="2700000" algn="ctr" rotWithShape="0">
@@ -32875,7 +32961,7 @@
               </a14:hiddenEffects>
             </a:ext>
             <a:ext uri="{FAA26D3D-D897-4be2-8F04-BA451C77F1D7}">
-              <ma14:placeholderFlag xmlns:ma14="http://schemas.microsoft.com/office/mac/drawingml/2011/main" xmlns="" val="1"/>
+              <ma14:placeholderFlag xmlns:ma14="http://schemas.microsoft.com/office/mac/drawingml/2011/main" val="1"/>
             </a:ext>
           </a:extLst>
         </p:spPr>
@@ -32913,7 +32999,7 @@
     <p:sldLayoutId id="2147483759" r:id="rId10"/>
     <p:sldLayoutId id="2147483760" r:id="rId11"/>
   </p:sldLayoutIdLst>
-  <p:transition/>
+  <p:transition xmlns:p14="http://schemas.microsoft.com/office/powerpoint/2010/main"/>
   <p:hf sldNum="0" hdr="0" dt="0"/>
   <p:txStyles>
     <p:titleStyle>
@@ -33430,14 +33516,14 @@
             <a:noFill/>
           </a:ln>
           <a:extLst>
-            <a:ext uri="{909E8E84-426E-40DD-AFC4-6F175D3DCCD1}">
+            <a:ext uri="{909E8E84-426E-40dd-AFC4-6F175D3DCCD1}">
               <a14:hiddenFill xmlns:a14="http://schemas.microsoft.com/office/drawing/2010/main">
                 <a:solidFill>
                   <a:srgbClr val="FFFFFF"/>
                 </a:solidFill>
               </a14:hiddenFill>
             </a:ext>
-            <a:ext uri="{91240B29-F687-4F45-9708-019B960494DF}">
+            <a:ext uri="{91240B29-F687-4f45-9708-019B960494DF}">
               <a14:hiddenLine xmlns:a14="http://schemas.microsoft.com/office/drawing/2010/main" w="25400">
                 <a:solidFill>
                   <a:schemeClr val="tx1"/>
@@ -33484,14 +33570,14 @@
             <a:noFill/>
           </a:ln>
           <a:extLst>
-            <a:ext uri="{909E8E84-426E-40DD-AFC4-6F175D3DCCD1}">
+            <a:ext uri="{909E8E84-426E-40dd-AFC4-6F175D3DCCD1}">
               <a14:hiddenFill xmlns:a14="http://schemas.microsoft.com/office/drawing/2010/main">
                 <a:solidFill>
                   <a:srgbClr val="FFFFFF"/>
                 </a:solidFill>
               </a14:hiddenFill>
             </a:ext>
-            <a:ext uri="{91240B29-F687-4F45-9708-019B960494DF}">
+            <a:ext uri="{91240B29-F687-4f45-9708-019B960494DF}">
               <a14:hiddenLine xmlns:a14="http://schemas.microsoft.com/office/drawing/2010/main" w="12700">
                 <a:solidFill>
                   <a:schemeClr val="tx1"/>
@@ -33525,14 +33611,14 @@
             <a:noFill/>
           </a:ln>
           <a:extLst>
-            <a:ext uri="{909E8E84-426E-40DD-AFC4-6F175D3DCCD1}">
+            <a:ext uri="{909E8E84-426E-40dd-AFC4-6F175D3DCCD1}">
               <a14:hiddenFill xmlns:a14="http://schemas.microsoft.com/office/drawing/2010/main">
                 <a:solidFill>
                   <a:srgbClr val="FFFFFF"/>
                 </a:solidFill>
               </a14:hiddenFill>
             </a:ext>
-            <a:ext uri="{91240B29-F687-4F45-9708-019B960494DF}">
+            <a:ext uri="{91240B29-F687-4f45-9708-019B960494DF}">
               <a14:hiddenLine xmlns:a14="http://schemas.microsoft.com/office/drawing/2010/main" w="12700">
                 <a:solidFill>
                   <a:schemeClr val="tx1"/>
@@ -33781,13 +33867,13 @@
   <p:clrMapOvr>
     <a:masterClrMapping/>
   </p:clrMapOvr>
-  <p:transition>
+  <p:transition xmlns:p14="http://schemas.microsoft.com/office/powerpoint/2010/main">
     <p:fade/>
   </p:transition>
   <p:timing>
     <p:tnLst>
       <p:par>
-        <p:cTn id="1" dur="indefinite" restart="never" nodeType="tmRoot"/>
+        <p:cTn xmlns:p14="http://schemas.microsoft.com/office/powerpoint/2010/main" id="1" dur="indefinite" restart="never" nodeType="tmRoot"/>
       </p:par>
     </p:tnLst>
   </p:timing>
@@ -33877,14 +33963,14 @@
             <a:noFill/>
           </a:ln>
           <a:extLst>
-            <a:ext uri="{909E8E84-426E-40DD-AFC4-6F175D3DCCD1}">
+            <a:ext uri="{909E8E84-426E-40dd-AFC4-6F175D3DCCD1}">
               <a14:hiddenFill xmlns:a14="http://schemas.microsoft.com/office/drawing/2010/main">
                 <a:solidFill>
                   <a:srgbClr val="FFFFFF"/>
                 </a:solidFill>
               </a14:hiddenFill>
             </a:ext>
-            <a:ext uri="{91240B29-F687-4F45-9708-019B960494DF}">
+            <a:ext uri="{91240B29-F687-4f45-9708-019B960494DF}">
               <a14:hiddenLine xmlns:a14="http://schemas.microsoft.com/office/drawing/2010/main" w="25400">
                 <a:solidFill>
                   <a:schemeClr val="tx1"/>
@@ -33918,14 +34004,14 @@
             <a:noFill/>
           </a:ln>
           <a:extLst>
-            <a:ext uri="{909E8E84-426E-40DD-AFC4-6F175D3DCCD1}">
+            <a:ext uri="{909E8E84-426E-40dd-AFC4-6F175D3DCCD1}">
               <a14:hiddenFill xmlns:a14="http://schemas.microsoft.com/office/drawing/2010/main">
                 <a:solidFill>
                   <a:srgbClr val="FFFFFF"/>
                 </a:solidFill>
               </a14:hiddenFill>
             </a:ext>
-            <a:ext uri="{91240B29-F687-4F45-9708-019B960494DF}">
+            <a:ext uri="{91240B29-F687-4f45-9708-019B960494DF}">
               <a14:hiddenLine xmlns:a14="http://schemas.microsoft.com/office/drawing/2010/main" w="12700">
                 <a:solidFill>
                   <a:schemeClr val="tx1"/>
@@ -34093,14 +34179,14 @@
               <a:noFill/>
             </a:ln>
             <a:extLst>
-              <a:ext uri="{909E8E84-426E-40DD-AFC4-6F175D3DCCD1}">
+              <a:ext uri="{909E8E84-426E-40dd-AFC4-6F175D3DCCD1}">
                 <a14:hiddenFill xmlns:a14="http://schemas.microsoft.com/office/drawing/2010/main">
                   <a:solidFill>
                     <a:srgbClr val="FFFFFF"/>
                   </a:solidFill>
                 </a14:hiddenFill>
               </a:ext>
-              <a:ext uri="{91240B29-F687-4F45-9708-019B960494DF}">
+              <a:ext uri="{91240B29-F687-4f45-9708-019B960494DF}">
                 <a14:hiddenLine xmlns:a14="http://schemas.microsoft.com/office/drawing/2010/main" w="12700">
                   <a:solidFill>
                     <a:schemeClr val="tx1"/>
@@ -34200,14 +34286,14 @@
               <a:noFill/>
             </a:ln>
             <a:extLst>
-              <a:ext uri="{909E8E84-426E-40DD-AFC4-6F175D3DCCD1}">
+              <a:ext uri="{909E8E84-426E-40dd-AFC4-6F175D3DCCD1}">
                 <a14:hiddenFill xmlns:a14="http://schemas.microsoft.com/office/drawing/2010/main">
                   <a:solidFill>
                     <a:srgbClr val="FFFFFF"/>
                   </a:solidFill>
                 </a14:hiddenFill>
               </a:ext>
-              <a:ext uri="{91240B29-F687-4F45-9708-019B960494DF}">
+              <a:ext uri="{91240B29-F687-4f45-9708-019B960494DF}">
                 <a14:hiddenLine xmlns:a14="http://schemas.microsoft.com/office/drawing/2010/main" w="12700">
                   <a:solidFill>
                     <a:schemeClr val="tx1"/>
@@ -34242,14 +34328,14 @@
             <a:noFill/>
           </a:ln>
           <a:extLst>
-            <a:ext uri="{909E8E84-426E-40DD-AFC4-6F175D3DCCD1}">
+            <a:ext uri="{909E8E84-426E-40dd-AFC4-6F175D3DCCD1}">
               <a14:hiddenFill xmlns:a14="http://schemas.microsoft.com/office/drawing/2010/main">
                 <a:solidFill>
                   <a:srgbClr val="FFFFFF"/>
                 </a:solidFill>
               </a14:hiddenFill>
             </a:ext>
-            <a:ext uri="{91240B29-F687-4F45-9708-019B960494DF}">
+            <a:ext uri="{91240B29-F687-4f45-9708-019B960494DF}">
               <a14:hiddenLine xmlns:a14="http://schemas.microsoft.com/office/drawing/2010/main" w="12700">
                 <a:solidFill>
                   <a:schemeClr val="tx1"/>
@@ -34330,7 +34416,7 @@
             <a:tailEnd/>
           </a:ln>
           <a:extLst>
-            <a:ext uri="{909E8E84-426E-40DD-AFC4-6F175D3DCCD1}">
+            <a:ext uri="{909E8E84-426E-40dd-AFC4-6F175D3DCCD1}">
               <a14:hiddenFill xmlns:a14="http://schemas.microsoft.com/office/drawing/2010/main">
                 <a:noFill/>
               </a14:hiddenFill>
@@ -34379,14 +34465,14 @@
             <a:noFill/>
           </a:ln>
           <a:extLst>
-            <a:ext uri="{909E8E84-426E-40DD-AFC4-6F175D3DCCD1}">
+            <a:ext uri="{909E8E84-426E-40dd-AFC4-6F175D3DCCD1}">
               <a14:hiddenFill xmlns:a14="http://schemas.microsoft.com/office/drawing/2010/main">
                 <a:solidFill>
                   <a:srgbClr val="FFFFFF"/>
                 </a:solidFill>
               </a14:hiddenFill>
             </a:ext>
-            <a:ext uri="{91240B29-F687-4F45-9708-019B960494DF}">
+            <a:ext uri="{91240B29-F687-4f45-9708-019B960494DF}">
               <a14:hiddenLine xmlns:a14="http://schemas.microsoft.com/office/drawing/2010/main" w="12700">
                 <a:solidFill>
                   <a:schemeClr val="tx1"/>
@@ -34409,13 +34495,13 @@
   <p:clrMapOvr>
     <a:masterClrMapping/>
   </p:clrMapOvr>
-  <p:transition>
+  <p:transition xmlns:p14="http://schemas.microsoft.com/office/powerpoint/2010/main">
     <p:fade/>
   </p:transition>
   <p:timing>
     <p:tnLst>
       <p:par>
-        <p:cTn id="1" dur="indefinite" restart="never" nodeType="tmRoot"/>
+        <p:cTn xmlns:p14="http://schemas.microsoft.com/office/powerpoint/2010/main" id="1" dur="indefinite" restart="never" nodeType="tmRoot"/>
       </p:par>
     </p:tnLst>
   </p:timing>
@@ -34505,14 +34591,14 @@
             <a:noFill/>
           </a:ln>
           <a:extLst>
-            <a:ext uri="{909E8E84-426E-40DD-AFC4-6F175D3DCCD1}">
+            <a:ext uri="{909E8E84-426E-40dd-AFC4-6F175D3DCCD1}">
               <a14:hiddenFill xmlns:a14="http://schemas.microsoft.com/office/drawing/2010/main">
                 <a:solidFill>
                   <a:srgbClr val="FFFFFF"/>
                 </a:solidFill>
               </a14:hiddenFill>
             </a:ext>
-            <a:ext uri="{91240B29-F687-4F45-9708-019B960494DF}">
+            <a:ext uri="{91240B29-F687-4f45-9708-019B960494DF}">
               <a14:hiddenLine xmlns:a14="http://schemas.microsoft.com/office/drawing/2010/main" w="25400">
                 <a:solidFill>
                   <a:schemeClr val="tx1"/>
@@ -34546,14 +34632,14 @@
             <a:noFill/>
           </a:ln>
           <a:extLst>
-            <a:ext uri="{909E8E84-426E-40DD-AFC4-6F175D3DCCD1}">
+            <a:ext uri="{909E8E84-426E-40dd-AFC4-6F175D3DCCD1}">
               <a14:hiddenFill xmlns:a14="http://schemas.microsoft.com/office/drawing/2010/main">
                 <a:solidFill>
                   <a:srgbClr val="FFFFFF"/>
                 </a:solidFill>
               </a14:hiddenFill>
             </a:ext>
-            <a:ext uri="{91240B29-F687-4F45-9708-019B960494DF}">
+            <a:ext uri="{91240B29-F687-4f45-9708-019B960494DF}">
               <a14:hiddenLine xmlns:a14="http://schemas.microsoft.com/office/drawing/2010/main" w="12700">
                 <a:solidFill>
                   <a:schemeClr val="tx1"/>
@@ -34701,14 +34787,14 @@
             <a:noFill/>
           </a:ln>
           <a:extLst>
-            <a:ext uri="{909E8E84-426E-40DD-AFC4-6F175D3DCCD1}">
+            <a:ext uri="{909E8E84-426E-40dd-AFC4-6F175D3DCCD1}">
               <a14:hiddenFill xmlns:a14="http://schemas.microsoft.com/office/drawing/2010/main">
                 <a:solidFill>
                   <a:srgbClr val="FFFFFF"/>
                 </a:solidFill>
               </a14:hiddenFill>
             </a:ext>
-            <a:ext uri="{91240B29-F687-4F45-9708-019B960494DF}">
+            <a:ext uri="{91240B29-F687-4f45-9708-019B960494DF}">
               <a14:hiddenLine xmlns:a14="http://schemas.microsoft.com/office/drawing/2010/main" w="12700">
                 <a:solidFill>
                   <a:schemeClr val="tx1"/>
@@ -34789,7 +34875,7 @@
             <a:tailEnd/>
           </a:ln>
           <a:extLst>
-            <a:ext uri="{909E8E84-426E-40DD-AFC4-6F175D3DCCD1}">
+            <a:ext uri="{909E8E84-426E-40dd-AFC4-6F175D3DCCD1}">
               <a14:hiddenFill xmlns:a14="http://schemas.microsoft.com/office/drawing/2010/main">
                 <a:noFill/>
               </a14:hiddenFill>
@@ -34838,14 +34924,14 @@
             <a:noFill/>
           </a:ln>
           <a:extLst>
-            <a:ext uri="{909E8E84-426E-40DD-AFC4-6F175D3DCCD1}">
+            <a:ext uri="{909E8E84-426E-40dd-AFC4-6F175D3DCCD1}">
               <a14:hiddenFill xmlns:a14="http://schemas.microsoft.com/office/drawing/2010/main">
                 <a:solidFill>
                   <a:srgbClr val="FFFFFF"/>
                 </a:solidFill>
               </a14:hiddenFill>
             </a:ext>
-            <a:ext uri="{91240B29-F687-4F45-9708-019B960494DF}">
+            <a:ext uri="{91240B29-F687-4f45-9708-019B960494DF}">
               <a14:hiddenLine xmlns:a14="http://schemas.microsoft.com/office/drawing/2010/main" w="12700">
                 <a:solidFill>
                   <a:schemeClr val="tx1"/>
@@ -34908,14 +34994,14 @@
               <a:noFill/>
             </a:ln>
             <a:extLst>
-              <a:ext uri="{909E8E84-426E-40DD-AFC4-6F175D3DCCD1}">
+              <a:ext uri="{909E8E84-426E-40dd-AFC4-6F175D3DCCD1}">
                 <a14:hiddenFill xmlns:a14="http://schemas.microsoft.com/office/drawing/2010/main">
                   <a:solidFill>
                     <a:srgbClr val="FFFFFF"/>
                   </a:solidFill>
                 </a14:hiddenFill>
               </a:ext>
-              <a:ext uri="{91240B29-F687-4F45-9708-019B960494DF}">
+              <a:ext uri="{91240B29-F687-4f45-9708-019B960494DF}">
                 <a14:hiddenLine xmlns:a14="http://schemas.microsoft.com/office/drawing/2010/main" w="12700">
                   <a:solidFill>
                     <a:schemeClr val="tx1"/>
@@ -34949,14 +35035,14 @@
               <a:noFill/>
             </a:ln>
             <a:extLst>
-              <a:ext uri="{909E8E84-426E-40DD-AFC4-6F175D3DCCD1}">
+              <a:ext uri="{909E8E84-426E-40dd-AFC4-6F175D3DCCD1}">
                 <a14:hiddenFill xmlns:a14="http://schemas.microsoft.com/office/drawing/2010/main">
                   <a:solidFill>
                     <a:srgbClr val="FFFFFF"/>
                   </a:solidFill>
                 </a14:hiddenFill>
               </a:ext>
-              <a:ext uri="{91240B29-F687-4F45-9708-019B960494DF}">
+              <a:ext uri="{91240B29-F687-4f45-9708-019B960494DF}">
                 <a14:hiddenLine xmlns:a14="http://schemas.microsoft.com/office/drawing/2010/main" w="12700">
                   <a:solidFill>
                     <a:schemeClr val="tx1"/>
@@ -35011,13 +35097,13 @@
   <p:clrMapOvr>
     <a:masterClrMapping/>
   </p:clrMapOvr>
-  <p:transition>
+  <p:transition xmlns:p14="http://schemas.microsoft.com/office/powerpoint/2010/main">
     <p:fade/>
   </p:transition>
   <p:timing>
     <p:tnLst>
       <p:par>
-        <p:cTn id="1" dur="indefinite" restart="never" nodeType="tmRoot"/>
+        <p:cTn xmlns:p14="http://schemas.microsoft.com/office/powerpoint/2010/main" id="1" dur="indefinite" restart="never" nodeType="tmRoot"/>
       </p:par>
     </p:tnLst>
   </p:timing>
@@ -35075,14 +35161,14 @@
             <a:noFill/>
           </a:ln>
           <a:extLst>
-            <a:ext uri="{909E8E84-426E-40DD-AFC4-6F175D3DCCD1}">
+            <a:ext uri="{909E8E84-426E-40dd-AFC4-6F175D3DCCD1}">
               <a14:hiddenFill xmlns:a14="http://schemas.microsoft.com/office/drawing/2010/main">
                 <a:solidFill>
                   <a:srgbClr val="FFFFFF"/>
                 </a:solidFill>
               </a14:hiddenFill>
             </a:ext>
-            <a:ext uri="{91240B29-F687-4F45-9708-019B960494DF}">
+            <a:ext uri="{91240B29-F687-4f45-9708-019B960494DF}">
               <a14:hiddenLine xmlns:a14="http://schemas.microsoft.com/office/drawing/2010/main" w="25400">
                 <a:solidFill>
                   <a:schemeClr val="tx1"/>
@@ -35403,18 +35489,7 @@
                   <a:ea typeface="MS PGothic" pitchFamily="34" charset="-128"/>
                   <a:sym typeface="Calibri Bold" pitchFamily="-84" charset="0"/>
                 </a:rPr>
-                <a:t> </a:t>
-              </a:r>
-              <a:r>
-                <a:rPr lang="en-US" sz="7700" b="1" dirty="0" smtClean="0">
-                  <a:solidFill>
-                    <a:srgbClr val="343434"/>
-                  </a:solidFill>
-                  <a:latin typeface="Calibri Bold" pitchFamily="-84" charset="0"/>
-                  <a:ea typeface="MS PGothic" pitchFamily="34" charset="-128"/>
-                  <a:sym typeface="Calibri Bold" pitchFamily="-84" charset="0"/>
-                </a:rPr>
-                <a:t>&amp; Cloning</a:t>
+                <a:t> &amp; Cloning</a:t>
               </a:r>
               <a:endParaRPr lang="en-US" sz="7700" b="1" dirty="0">
                 <a:solidFill>
@@ -36388,13 +36463,13 @@
   <p:clrMapOvr>
     <a:masterClrMapping/>
   </p:clrMapOvr>
-  <p:transition>
+  <p:transition xmlns:p14="http://schemas.microsoft.com/office/powerpoint/2010/main">
     <p:fade/>
   </p:transition>
   <p:timing>
     <p:tnLst>
       <p:par>
-        <p:cTn id="1" dur="indefinite" restart="never" nodeType="tmRoot">
+        <p:cTn xmlns:p14="http://schemas.microsoft.com/office/powerpoint/2010/main" id="1" dur="indefinite" restart="never" nodeType="tmRoot">
           <p:childTnLst>
             <p:seq concurrent="1" nextAc="seek">
               <p:cTn id="2" dur="indefinite" nodeType="mainSeq">
@@ -36864,14 +36939,14 @@
             <a:noFill/>
           </a:ln>
           <a:extLst>
-            <a:ext uri="{909E8E84-426E-40DD-AFC4-6F175D3DCCD1}">
+            <a:ext uri="{909E8E84-426E-40dd-AFC4-6F175D3DCCD1}">
               <a14:hiddenFill xmlns:a14="http://schemas.microsoft.com/office/drawing/2010/main">
                 <a:solidFill>
                   <a:srgbClr val="FFFFFF"/>
                 </a:solidFill>
               </a14:hiddenFill>
             </a:ext>
-            <a:ext uri="{91240B29-F687-4F45-9708-019B960494DF}">
+            <a:ext uri="{91240B29-F687-4f45-9708-019B960494DF}">
               <a14:hiddenLine xmlns:a14="http://schemas.microsoft.com/office/drawing/2010/main" w="25400">
                 <a:solidFill>
                   <a:schemeClr val="tx1"/>
@@ -36905,14 +36980,14 @@
             <a:noFill/>
           </a:ln>
           <a:extLst>
-            <a:ext uri="{909E8E84-426E-40DD-AFC4-6F175D3DCCD1}">
+            <a:ext uri="{909E8E84-426E-40dd-AFC4-6F175D3DCCD1}">
               <a14:hiddenFill xmlns:a14="http://schemas.microsoft.com/office/drawing/2010/main">
                 <a:solidFill>
                   <a:srgbClr val="FFFFFF"/>
                 </a:solidFill>
               </a14:hiddenFill>
             </a:ext>
-            <a:ext uri="{91240B29-F687-4F45-9708-019B960494DF}">
+            <a:ext uri="{91240B29-F687-4f45-9708-019B960494DF}">
               <a14:hiddenLine xmlns:a14="http://schemas.microsoft.com/office/drawing/2010/main" w="12700">
                 <a:solidFill>
                   <a:schemeClr val="tx1"/>
@@ -36961,14 +37036,14 @@
             <a:noFill/>
           </a:ln>
           <a:extLst>
-            <a:ext uri="{909E8E84-426E-40DD-AFC4-6F175D3DCCD1}">
+            <a:ext uri="{909E8E84-426E-40dd-AFC4-6F175D3DCCD1}">
               <a14:hiddenFill xmlns:a14="http://schemas.microsoft.com/office/drawing/2010/main">
                 <a:solidFill>
                   <a:srgbClr val="FFFFFF"/>
                 </a:solidFill>
               </a14:hiddenFill>
             </a:ext>
-            <a:ext uri="{91240B29-F687-4F45-9708-019B960494DF}">
+            <a:ext uri="{91240B29-F687-4f45-9708-019B960494DF}">
               <a14:hiddenLine xmlns:a14="http://schemas.microsoft.com/office/drawing/2010/main" w="12700">
                 <a:solidFill>
                   <a:schemeClr val="tx1"/>
@@ -37049,7 +37124,7 @@
             <a:tailEnd/>
           </a:ln>
           <a:extLst>
-            <a:ext uri="{909E8E84-426E-40DD-AFC4-6F175D3DCCD1}">
+            <a:ext uri="{909E8E84-426E-40dd-AFC4-6F175D3DCCD1}">
               <a14:hiddenFill xmlns:a14="http://schemas.microsoft.com/office/drawing/2010/main">
                 <a:noFill/>
               </a14:hiddenFill>
@@ -37098,14 +37173,14 @@
             <a:noFill/>
           </a:ln>
           <a:extLst>
-            <a:ext uri="{909E8E84-426E-40DD-AFC4-6F175D3DCCD1}">
+            <a:ext uri="{909E8E84-426E-40dd-AFC4-6F175D3DCCD1}">
               <a14:hiddenFill xmlns:a14="http://schemas.microsoft.com/office/drawing/2010/main">
                 <a:solidFill>
                   <a:srgbClr val="FFFFFF"/>
                 </a:solidFill>
               </a14:hiddenFill>
             </a:ext>
-            <a:ext uri="{91240B29-F687-4F45-9708-019B960494DF}">
+            <a:ext uri="{91240B29-F687-4f45-9708-019B960494DF}">
               <a14:hiddenLine xmlns:a14="http://schemas.microsoft.com/office/drawing/2010/main" w="12700">
                 <a:solidFill>
                   <a:schemeClr val="tx1"/>
@@ -37152,14 +37227,14 @@
             <a:noFill/>
           </a:ln>
           <a:extLst>
-            <a:ext uri="{909E8E84-426E-40DD-AFC4-6F175D3DCCD1}">
+            <a:ext uri="{909E8E84-426E-40dd-AFC4-6F175D3DCCD1}">
               <a14:hiddenFill xmlns:a14="http://schemas.microsoft.com/office/drawing/2010/main">
                 <a:solidFill>
                   <a:srgbClr val="FFFFFF"/>
                 </a:solidFill>
               </a14:hiddenFill>
             </a:ext>
-            <a:ext uri="{91240B29-F687-4F45-9708-019B960494DF}">
+            <a:ext uri="{91240B29-F687-4f45-9708-019B960494DF}">
               <a14:hiddenLine xmlns:a14="http://schemas.microsoft.com/office/drawing/2010/main" w="12700">
                 <a:solidFill>
                   <a:schemeClr val="tx1"/>
@@ -37212,13 +37287,13 @@
   <p:clrMapOvr>
     <a:masterClrMapping/>
   </p:clrMapOvr>
-  <p:transition>
+  <p:transition xmlns:p14="http://schemas.microsoft.com/office/powerpoint/2010/main">
     <p:fade/>
   </p:transition>
   <p:timing>
     <p:tnLst>
       <p:par>
-        <p:cTn id="1" dur="indefinite" restart="never" nodeType="tmRoot"/>
+        <p:cTn xmlns:p14="http://schemas.microsoft.com/office/powerpoint/2010/main" id="1" dur="indefinite" restart="never" nodeType="tmRoot"/>
       </p:par>
     </p:tnLst>
   </p:timing>
@@ -37308,14 +37383,14 @@
             <a:noFill/>
           </a:ln>
           <a:extLst>
-            <a:ext uri="{909E8E84-426E-40DD-AFC4-6F175D3DCCD1}">
+            <a:ext uri="{909E8E84-426E-40dd-AFC4-6F175D3DCCD1}">
               <a14:hiddenFill xmlns:a14="http://schemas.microsoft.com/office/drawing/2010/main">
                 <a:solidFill>
                   <a:srgbClr val="FFFFFF"/>
                 </a:solidFill>
               </a14:hiddenFill>
             </a:ext>
-            <a:ext uri="{91240B29-F687-4F45-9708-019B960494DF}">
+            <a:ext uri="{91240B29-F687-4f45-9708-019B960494DF}">
               <a14:hiddenLine xmlns:a14="http://schemas.microsoft.com/office/drawing/2010/main" w="25400">
                 <a:solidFill>
                   <a:schemeClr val="tx1"/>
@@ -37349,14 +37424,14 @@
             <a:noFill/>
           </a:ln>
           <a:extLst>
-            <a:ext uri="{909E8E84-426E-40DD-AFC4-6F175D3DCCD1}">
+            <a:ext uri="{909E8E84-426E-40dd-AFC4-6F175D3DCCD1}">
               <a14:hiddenFill xmlns:a14="http://schemas.microsoft.com/office/drawing/2010/main">
                 <a:solidFill>
                   <a:srgbClr val="FFFFFF"/>
                 </a:solidFill>
               </a14:hiddenFill>
             </a:ext>
-            <a:ext uri="{91240B29-F687-4F45-9708-019B960494DF}">
+            <a:ext uri="{91240B29-F687-4f45-9708-019B960494DF}">
               <a14:hiddenLine xmlns:a14="http://schemas.microsoft.com/office/drawing/2010/main" w="12700">
                 <a:solidFill>
                   <a:schemeClr val="tx1"/>
@@ -38049,14 +38124,14 @@
             <a:noFill/>
           </a:ln>
           <a:extLst>
-            <a:ext uri="{909E8E84-426E-40DD-AFC4-6F175D3DCCD1}">
+            <a:ext uri="{909E8E84-426E-40dd-AFC4-6F175D3DCCD1}">
               <a14:hiddenFill xmlns:a14="http://schemas.microsoft.com/office/drawing/2010/main">
                 <a:solidFill>
                   <a:srgbClr val="FFFFFF"/>
                 </a:solidFill>
               </a14:hiddenFill>
             </a:ext>
-            <a:ext uri="{91240B29-F687-4F45-9708-019B960494DF}">
+            <a:ext uri="{91240B29-F687-4f45-9708-019B960494DF}">
               <a14:hiddenLine xmlns:a14="http://schemas.microsoft.com/office/drawing/2010/main" w="12700">
                 <a:solidFill>
                   <a:schemeClr val="tx1"/>
@@ -38137,7 +38212,7 @@
             <a:tailEnd/>
           </a:ln>
           <a:extLst>
-            <a:ext uri="{909E8E84-426E-40DD-AFC4-6F175D3DCCD1}">
+            <a:ext uri="{909E8E84-426E-40dd-AFC4-6F175D3DCCD1}">
               <a14:hiddenFill xmlns:a14="http://schemas.microsoft.com/office/drawing/2010/main">
                 <a:noFill/>
               </a14:hiddenFill>
@@ -38186,14 +38261,14 @@
             <a:noFill/>
           </a:ln>
           <a:extLst>
-            <a:ext uri="{909E8E84-426E-40DD-AFC4-6F175D3DCCD1}">
+            <a:ext uri="{909E8E84-426E-40dd-AFC4-6F175D3DCCD1}">
               <a14:hiddenFill xmlns:a14="http://schemas.microsoft.com/office/drawing/2010/main">
                 <a:solidFill>
                   <a:srgbClr val="FFFFFF"/>
                 </a:solidFill>
               </a14:hiddenFill>
             </a:ext>
-            <a:ext uri="{91240B29-F687-4F45-9708-019B960494DF}">
+            <a:ext uri="{91240B29-F687-4f45-9708-019B960494DF}">
               <a14:hiddenLine xmlns:a14="http://schemas.microsoft.com/office/drawing/2010/main" w="12700">
                 <a:solidFill>
                   <a:schemeClr val="tx1"/>
@@ -38243,14 +38318,14 @@
               <a:noFill/>
             </a:ln>
             <a:extLst>
-              <a:ext uri="{909E8E84-426E-40DD-AFC4-6F175D3DCCD1}">
+              <a:ext uri="{909E8E84-426E-40dd-AFC4-6F175D3DCCD1}">
                 <a14:hiddenFill xmlns:a14="http://schemas.microsoft.com/office/drawing/2010/main">
                   <a:solidFill>
                     <a:srgbClr val="FFFFFF"/>
                   </a:solidFill>
                 </a14:hiddenFill>
               </a:ext>
-              <a:ext uri="{91240B29-F687-4F45-9708-019B960494DF}">
+              <a:ext uri="{91240B29-F687-4f45-9708-019B960494DF}">
                 <a14:hiddenLine xmlns:a14="http://schemas.microsoft.com/office/drawing/2010/main" w="12700">
                   <a:solidFill>
                     <a:schemeClr val="tx1"/>
@@ -38336,14 +38411,14 @@
               <a:noFill/>
             </a:ln>
             <a:extLst>
-              <a:ext uri="{909E8E84-426E-40DD-AFC4-6F175D3DCCD1}">
+              <a:ext uri="{909E8E84-426E-40dd-AFC4-6F175D3DCCD1}">
                 <a14:hiddenFill xmlns:a14="http://schemas.microsoft.com/office/drawing/2010/main">
                   <a:solidFill>
                     <a:srgbClr val="FFFFFF"/>
                   </a:solidFill>
                 </a14:hiddenFill>
               </a:ext>
-              <a:ext uri="{91240B29-F687-4F45-9708-019B960494DF}">
+              <a:ext uri="{91240B29-F687-4f45-9708-019B960494DF}">
                 <a14:hiddenLine xmlns:a14="http://schemas.microsoft.com/office/drawing/2010/main" w="12700">
                   <a:solidFill>
                     <a:schemeClr val="tx1"/>
@@ -38367,13 +38442,13 @@
   <p:clrMapOvr>
     <a:masterClrMapping/>
   </p:clrMapOvr>
-  <p:transition>
+  <p:transition xmlns:p14="http://schemas.microsoft.com/office/powerpoint/2010/main">
     <p:fade/>
   </p:transition>
   <p:timing>
     <p:tnLst>
       <p:par>
-        <p:cTn id="1" dur="indefinite" restart="never" nodeType="tmRoot"/>
+        <p:cTn xmlns:p14="http://schemas.microsoft.com/office/powerpoint/2010/main" id="1" dur="indefinite" restart="never" nodeType="tmRoot"/>
       </p:par>
     </p:tnLst>
   </p:timing>
@@ -38463,14 +38538,14 @@
             <a:noFill/>
           </a:ln>
           <a:extLst>
-            <a:ext uri="{909E8E84-426E-40DD-AFC4-6F175D3DCCD1}">
+            <a:ext uri="{909E8E84-426E-40dd-AFC4-6F175D3DCCD1}">
               <a14:hiddenFill xmlns:a14="http://schemas.microsoft.com/office/drawing/2010/main">
                 <a:solidFill>
                   <a:srgbClr val="FFFFFF"/>
                 </a:solidFill>
               </a14:hiddenFill>
             </a:ext>
-            <a:ext uri="{91240B29-F687-4F45-9708-019B960494DF}">
+            <a:ext uri="{91240B29-F687-4f45-9708-019B960494DF}">
               <a14:hiddenLine xmlns:a14="http://schemas.microsoft.com/office/drawing/2010/main" w="25400">
                 <a:solidFill>
                   <a:schemeClr val="tx1"/>
@@ -38504,14 +38579,14 @@
             <a:noFill/>
           </a:ln>
           <a:extLst>
-            <a:ext uri="{909E8E84-426E-40DD-AFC4-6F175D3DCCD1}">
+            <a:ext uri="{909E8E84-426E-40dd-AFC4-6F175D3DCCD1}">
               <a14:hiddenFill xmlns:a14="http://schemas.microsoft.com/office/drawing/2010/main">
                 <a:solidFill>
                   <a:srgbClr val="FFFFFF"/>
                 </a:solidFill>
               </a14:hiddenFill>
             </a:ext>
-            <a:ext uri="{91240B29-F687-4F45-9708-019B960494DF}">
+            <a:ext uri="{91240B29-F687-4f45-9708-019B960494DF}">
               <a14:hiddenLine xmlns:a14="http://schemas.microsoft.com/office/drawing/2010/main" w="12700">
                 <a:solidFill>
                   <a:schemeClr val="tx1"/>
@@ -38560,14 +38635,14 @@
             <a:noFill/>
           </a:ln>
           <a:extLst>
-            <a:ext uri="{909E8E84-426E-40DD-AFC4-6F175D3DCCD1}">
+            <a:ext uri="{909E8E84-426E-40dd-AFC4-6F175D3DCCD1}">
               <a14:hiddenFill xmlns:a14="http://schemas.microsoft.com/office/drawing/2010/main">
                 <a:solidFill>
                   <a:srgbClr val="FFFFFF"/>
                 </a:solidFill>
               </a14:hiddenFill>
             </a:ext>
-            <a:ext uri="{91240B29-F687-4F45-9708-019B960494DF}">
+            <a:ext uri="{91240B29-F687-4f45-9708-019B960494DF}">
               <a14:hiddenLine xmlns:a14="http://schemas.microsoft.com/office/drawing/2010/main" w="12700">
                 <a:solidFill>
                   <a:schemeClr val="tx1"/>
@@ -38648,7 +38723,7 @@
             <a:tailEnd/>
           </a:ln>
           <a:extLst>
-            <a:ext uri="{909E8E84-426E-40DD-AFC4-6F175D3DCCD1}">
+            <a:ext uri="{909E8E84-426E-40dd-AFC4-6F175D3DCCD1}">
               <a14:hiddenFill xmlns:a14="http://schemas.microsoft.com/office/drawing/2010/main">
                 <a:noFill/>
               </a14:hiddenFill>
@@ -38697,14 +38772,14 @@
             <a:noFill/>
           </a:ln>
           <a:extLst>
-            <a:ext uri="{909E8E84-426E-40DD-AFC4-6F175D3DCCD1}">
+            <a:ext uri="{909E8E84-426E-40dd-AFC4-6F175D3DCCD1}">
               <a14:hiddenFill xmlns:a14="http://schemas.microsoft.com/office/drawing/2010/main">
                 <a:solidFill>
                   <a:srgbClr val="FFFFFF"/>
                 </a:solidFill>
               </a14:hiddenFill>
             </a:ext>
-            <a:ext uri="{91240B29-F687-4F45-9708-019B960494DF}">
+            <a:ext uri="{91240B29-F687-4f45-9708-019B960494DF}">
               <a14:hiddenLine xmlns:a14="http://schemas.microsoft.com/office/drawing/2010/main" w="12700">
                 <a:solidFill>
                   <a:schemeClr val="tx1"/>
@@ -38754,14 +38829,14 @@
               <a:noFill/>
             </a:ln>
             <a:extLst>
-              <a:ext uri="{909E8E84-426E-40DD-AFC4-6F175D3DCCD1}">
+              <a:ext uri="{909E8E84-426E-40dd-AFC4-6F175D3DCCD1}">
                 <a14:hiddenFill xmlns:a14="http://schemas.microsoft.com/office/drawing/2010/main">
                   <a:solidFill>
                     <a:srgbClr val="FFFFFF"/>
                   </a:solidFill>
                 </a14:hiddenFill>
               </a:ext>
-              <a:ext uri="{91240B29-F687-4F45-9708-019B960494DF}">
+              <a:ext uri="{91240B29-F687-4f45-9708-019B960494DF}">
                 <a14:hiddenLine xmlns:a14="http://schemas.microsoft.com/office/drawing/2010/main" w="12700">
                   <a:solidFill>
                     <a:schemeClr val="tx1"/>
@@ -38847,14 +38922,14 @@
               <a:noFill/>
             </a:ln>
             <a:extLst>
-              <a:ext uri="{909E8E84-426E-40DD-AFC4-6F175D3DCCD1}">
+              <a:ext uri="{909E8E84-426E-40dd-AFC4-6F175D3DCCD1}">
                 <a14:hiddenFill xmlns:a14="http://schemas.microsoft.com/office/drawing/2010/main">
                   <a:solidFill>
                     <a:srgbClr val="FFFFFF"/>
                   </a:solidFill>
                 </a14:hiddenFill>
               </a:ext>
-              <a:ext uri="{91240B29-F687-4F45-9708-019B960494DF}">
+              <a:ext uri="{91240B29-F687-4f45-9708-019B960494DF}">
                 <a14:hiddenLine xmlns:a14="http://schemas.microsoft.com/office/drawing/2010/main" w="12700">
                   <a:solidFill>
                     <a:schemeClr val="tx1"/>
@@ -38908,13 +38983,393 @@
   <p:clrMapOvr>
     <a:masterClrMapping/>
   </p:clrMapOvr>
-  <p:transition>
+  <p:transition xmlns:p14="http://schemas.microsoft.com/office/powerpoint/2010/main">
     <p:fade/>
   </p:transition>
   <p:timing>
     <p:tnLst>
       <p:par>
-        <p:cTn id="1" dur="indefinite" restart="never" nodeType="tmRoot"/>
+        <p:cTn xmlns:p14="http://schemas.microsoft.com/office/powerpoint/2010/main" id="1" dur="indefinite" restart="never" nodeType="tmRoot"/>
+      </p:par>
+    </p:tnLst>
+  </p:timing>
+</p:sld>
+</file>
+
+<file path=ppt/slides/slide8.xml><?xml version="1.0" encoding="utf-8"?>
+<p:sld xmlns:a="http://schemas.openxmlformats.org/drawingml/2006/main" xmlns:r="http://schemas.openxmlformats.org/officeDocument/2006/relationships" xmlns:p="http://schemas.openxmlformats.org/presentationml/2006/main">
+  <p:cSld>
+    <p:spTree>
+      <p:nvGrpSpPr>
+        <p:cNvPr id="1" name=""/>
+        <p:cNvGrpSpPr/>
+        <p:nvPr/>
+      </p:nvGrpSpPr>
+      <p:grpSpPr>
+        <a:xfrm>
+          <a:off x="0" y="0"/>
+          <a:ext cx="0" cy="0"/>
+          <a:chOff x="0" y="0"/>
+          <a:chExt cx="0" cy="0"/>
+        </a:xfrm>
+      </p:grpSpPr>
+      <p:pic>
+        <p:nvPicPr>
+          <p:cNvPr id="15361" name="Picture 1"/>
+          <p:cNvPicPr>
+            <a:picLocks noChangeAspect="1" noChangeArrowheads="1"/>
+          </p:cNvPicPr>
+          <p:nvPr/>
+        </p:nvPicPr>
+        <p:blipFill>
+          <a:blip r:embed="rId3">
+            <a:extLst>
+              <a:ext uri="{28A0092B-C50C-407E-A947-70E740481C1C}">
+                <a14:useLocalDpi xmlns:a14="http://schemas.microsoft.com/office/drawing/2010/main" val="0"/>
+              </a:ext>
+            </a:extLst>
+          </a:blip>
+          <a:srcRect/>
+          <a:stretch>
+            <a:fillRect/>
+          </a:stretch>
+        </p:blipFill>
+        <p:spPr bwMode="auto">
+          <a:xfrm>
+            <a:off x="0" y="54768"/>
+            <a:ext cx="24384000" cy="13716000"/>
+          </a:xfrm>
+          <a:prstGeom prst="rect">
+            <a:avLst/>
+          </a:prstGeom>
+          <a:noFill/>
+          <a:ln>
+            <a:noFill/>
+          </a:ln>
+          <a:extLst>
+            <a:ext uri="{909E8E84-426E-40dd-AFC4-6F175D3DCCD1}">
+              <a14:hiddenFill xmlns:a14="http://schemas.microsoft.com/office/drawing/2010/main">
+                <a:solidFill>
+                  <a:srgbClr val="FFFFFF"/>
+                </a:solidFill>
+              </a14:hiddenFill>
+            </a:ext>
+            <a:ext uri="{91240B29-F687-4f45-9708-019B960494DF}">
+              <a14:hiddenLine xmlns:a14="http://schemas.microsoft.com/office/drawing/2010/main" w="25400">
+                <a:solidFill>
+                  <a:schemeClr val="tx1"/>
+                </a:solidFill>
+                <a:round/>
+                <a:headEnd/>
+                <a:tailEnd/>
+              </a14:hiddenLine>
+            </a:ext>
+          </a:extLst>
+        </p:spPr>
+      </p:pic>
+      <p:pic>
+        <p:nvPicPr>
+          <p:cNvPr id="15362" name="Picture 2"/>
+          <p:cNvPicPr>
+            <a:picLocks noChangeArrowheads="1"/>
+          </p:cNvPicPr>
+          <p:nvPr/>
+        </p:nvPicPr>
+        <p:blipFill>
+          <a:blip r:embed="rId4">
+            <a:extLst>
+              <a:ext uri="{28A0092B-C50C-407E-A947-70E740481C1C}">
+                <a14:useLocalDpi xmlns:a14="http://schemas.microsoft.com/office/drawing/2010/main" val="0"/>
+              </a:ext>
+            </a:extLst>
+          </a:blip>
+          <a:srcRect/>
+          <a:stretch>
+            <a:fillRect/>
+          </a:stretch>
+        </p:blipFill>
+        <p:spPr bwMode="auto">
+          <a:xfrm>
+            <a:off x="12941300" y="3257600"/>
+            <a:ext cx="7327900" cy="1968500"/>
+          </a:xfrm>
+          <a:prstGeom prst="rect">
+            <a:avLst/>
+          </a:prstGeom>
+          <a:noFill/>
+          <a:ln>
+            <a:noFill/>
+          </a:ln>
+          <a:extLst>
+            <a:ext uri="{909E8E84-426E-40dd-AFC4-6F175D3DCCD1}">
+              <a14:hiddenFill xmlns:a14="http://schemas.microsoft.com/office/drawing/2010/main">
+                <a:solidFill>
+                  <a:srgbClr val="FFFFFF"/>
+                </a:solidFill>
+              </a14:hiddenFill>
+            </a:ext>
+            <a:ext uri="{91240B29-F687-4f45-9708-019B960494DF}">
+              <a14:hiddenLine xmlns:a14="http://schemas.microsoft.com/office/drawing/2010/main" w="12700">
+                <a:solidFill>
+                  <a:schemeClr val="tx1"/>
+                </a:solidFill>
+                <a:miter lim="800000"/>
+                <a:headEnd/>
+                <a:tailEnd/>
+              </a14:hiddenLine>
+            </a:ext>
+          </a:extLst>
+        </p:spPr>
+      </p:pic>
+      <p:sp>
+        <p:nvSpPr>
+          <p:cNvPr id="15365" name="Rectangle 5"/>
+          <p:cNvSpPr>
+            <a:spLocks/>
+          </p:cNvSpPr>
+          <p:nvPr/>
+        </p:nvSpPr>
+        <p:spPr bwMode="auto">
+          <a:xfrm>
+            <a:off x="9893300" y="9664700"/>
+            <a:ext cx="13423900" cy="2305868"/>
+          </a:xfrm>
+          <a:prstGeom prst="rect">
+            <a:avLst/>
+          </a:prstGeom>
+          <a:noFill/>
+          <a:ln>
+            <a:noFill/>
+          </a:ln>
+          <a:extLst>
+            <a:ext uri="{909E8E84-426E-40dd-AFC4-6F175D3DCCD1}">
+              <a14:hiddenFill xmlns:a14="http://schemas.microsoft.com/office/drawing/2010/main">
+                <a:solidFill>
+                  <a:srgbClr val="FFFFFF"/>
+                </a:solidFill>
+              </a14:hiddenFill>
+            </a:ext>
+            <a:ext uri="{91240B29-F687-4f45-9708-019B960494DF}">
+              <a14:hiddenLine xmlns:a14="http://schemas.microsoft.com/office/drawing/2010/main" w="12700">
+                <a:solidFill>
+                  <a:schemeClr val="tx1"/>
+                </a:solidFill>
+                <a:miter lim="800000"/>
+                <a:headEnd/>
+                <a:tailEnd/>
+              </a14:hiddenLine>
+            </a:ext>
+          </a:extLst>
+        </p:spPr>
+        <p:txBody>
+          <a:bodyPr lIns="0" tIns="0" rIns="0" bIns="0"/>
+          <a:lstStyle/>
+          <a:p>
+            <a:pPr>
+              <a:lnSpc>
+                <a:spcPct val="90000"/>
+              </a:lnSpc>
+            </a:pPr>
+            <a:r>
+              <a:rPr lang="en-US" sz="3000" dirty="0">
+                <a:solidFill>
+                  <a:srgbClr val="343434"/>
+                </a:solidFill>
+                <a:latin typeface="Calibri" pitchFamily="34" charset="0"/>
+                <a:ea typeface="MS PGothic" pitchFamily="34" charset="-128"/>
+                <a:sym typeface="Calibri" pitchFamily="34" charset="0"/>
+              </a:rPr>
+              <a:t>Presented by</a:t>
+            </a:r>
+          </a:p>
+          <a:p>
+            <a:pPr>
+              <a:lnSpc>
+                <a:spcPct val="90000"/>
+              </a:lnSpc>
+            </a:pPr>
+            <a:r>
+              <a:rPr lang="en-US" sz="6000" b="1" dirty="0">
+                <a:solidFill>
+                  <a:srgbClr val="343434"/>
+                </a:solidFill>
+                <a:latin typeface="Calibri Bold" pitchFamily="-84" charset="0"/>
+                <a:ea typeface="MS PGothic" pitchFamily="34" charset="-128"/>
+                <a:sym typeface="Calibri Bold" pitchFamily="-84" charset="0"/>
+              </a:rPr>
+              <a:t>Stephen McCalden</a:t>
+            </a:r>
+          </a:p>
+          <a:p>
+            <a:pPr>
+              <a:lnSpc>
+                <a:spcPct val="90000"/>
+              </a:lnSpc>
+            </a:pPr>
+            <a:r>
+              <a:rPr lang="en-US" sz="3000" dirty="0">
+                <a:solidFill>
+                  <a:srgbClr val="343434"/>
+                </a:solidFill>
+                <a:latin typeface="Calibri"/>
+                <a:ea typeface="MS PGothic" pitchFamily="34" charset="-128"/>
+                <a:sym typeface="Calibri Bold" pitchFamily="-84" charset="0"/>
+                <a:hlinkClick r:id="rId5"/>
+              </a:rPr>
+              <a:t>www.twitter.com/SMcCalden</a:t>
+            </a:r>
+          </a:p>
+          <a:p>
+            <a:pPr>
+              <a:lnSpc>
+                <a:spcPct val="90000"/>
+              </a:lnSpc>
+            </a:pPr>
+            <a:r>
+              <a:rPr lang="en-US" sz="3000" dirty="0">
+                <a:solidFill>
+                  <a:srgbClr val="343434"/>
+                </a:solidFill>
+                <a:latin typeface="Calibri" pitchFamily="34" charset="0"/>
+                <a:ea typeface="MS PGothic" pitchFamily="34" charset="-128"/>
+                <a:sym typeface="Calibri" pitchFamily="34" charset="0"/>
+                <a:hlinkClick r:id="rId6"/>
+              </a:rPr>
+              <a:t>www.GitHub.com/SMcCalden</a:t>
+            </a:r>
+            <a:endParaRPr lang="en-US" sz="3000" dirty="0">
+              <a:solidFill>
+                <a:srgbClr val="343434"/>
+              </a:solidFill>
+              <a:latin typeface="Calibri" pitchFamily="34" charset="0"/>
+              <a:ea typeface="MS PGothic" pitchFamily="34" charset="-128"/>
+              <a:sym typeface="Calibri" pitchFamily="34" charset="0"/>
+            </a:endParaRPr>
+          </a:p>
+          <a:p>
+            <a:pPr>
+              <a:lnSpc>
+                <a:spcPct val="90000"/>
+              </a:lnSpc>
+            </a:pPr>
+            <a:endParaRPr lang="en-US" sz="6000" b="1" dirty="0">
+              <a:solidFill>
+                <a:srgbClr val="343434"/>
+              </a:solidFill>
+              <a:latin typeface="Calibri Bold" pitchFamily="-84" charset="0"/>
+              <a:ea typeface="MS PGothic" pitchFamily="34" charset="-128"/>
+              <a:sym typeface="Calibri Bold" pitchFamily="-84" charset="0"/>
+            </a:endParaRPr>
+          </a:p>
+        </p:txBody>
+      </p:sp>
+      <p:sp>
+        <p:nvSpPr>
+          <p:cNvPr id="5" name="Line 4"/>
+          <p:cNvSpPr>
+            <a:spLocks noChangeShapeType="1"/>
+          </p:cNvSpPr>
+          <p:nvPr/>
+        </p:nvSpPr>
+        <p:spPr bwMode="auto">
+          <a:xfrm rot="10800000" flipH="1">
+            <a:off x="12118975" y="4985792"/>
+            <a:ext cx="9047163" cy="0"/>
+          </a:xfrm>
+          <a:prstGeom prst="line">
+            <a:avLst/>
+          </a:prstGeom>
+          <a:noFill/>
+          <a:ln w="12700">
+            <a:solidFill>
+              <a:srgbClr val="343434"/>
+            </a:solidFill>
+            <a:prstDash val="sysDot"/>
+            <a:miter lim="800000"/>
+            <a:headEnd/>
+            <a:tailEnd/>
+          </a:ln>
+        </p:spPr>
+        <p:txBody>
+          <a:bodyPr lIns="0" tIns="0" rIns="0" bIns="0"/>
+          <a:lstStyle/>
+          <a:p>
+            <a:endParaRPr lang="en-GB"/>
+          </a:p>
+        </p:txBody>
+      </p:sp>
+      <p:sp>
+        <p:nvSpPr>
+          <p:cNvPr id="6" name="Rectangle 3"/>
+          <p:cNvSpPr>
+            <a:spLocks/>
+          </p:cNvSpPr>
+          <p:nvPr/>
+        </p:nvSpPr>
+        <p:spPr bwMode="auto">
+          <a:xfrm>
+            <a:off x="9893300" y="5207000"/>
+            <a:ext cx="13423900" cy="1358900"/>
+          </a:xfrm>
+          <a:prstGeom prst="rect">
+            <a:avLst/>
+          </a:prstGeom>
+          <a:noFill/>
+          <a:ln w="12700">
+            <a:noFill/>
+            <a:miter lim="800000"/>
+            <a:headEnd/>
+            <a:tailEnd/>
+          </a:ln>
+        </p:spPr>
+        <p:txBody>
+          <a:bodyPr lIns="0" tIns="0" rIns="0" bIns="0"/>
+          <a:lstStyle/>
+          <a:p>
+            <a:pPr>
+              <a:lnSpc>
+                <a:spcPct val="120000"/>
+              </a:lnSpc>
+            </a:pPr>
+            <a:r>
+              <a:rPr lang="en-GB" sz="6000" b="1" dirty="0" smtClean="0">
+                <a:solidFill>
+                  <a:srgbClr val="343434"/>
+                </a:solidFill>
+                <a:latin typeface="Calibri" pitchFamily="34" charset="0"/>
+                <a:ea typeface="MS PGothic" pitchFamily="34" charset="-128"/>
+                <a:sym typeface="Calibri" pitchFamily="34" charset="0"/>
+              </a:rPr>
+              <a:t>Questions??</a:t>
+            </a:r>
+            <a:endParaRPr lang="en-US" sz="6000" b="1" dirty="0">
+              <a:solidFill>
+                <a:srgbClr val="343434"/>
+              </a:solidFill>
+              <a:latin typeface="Calibri" pitchFamily="34" charset="0"/>
+              <a:ea typeface="MS PGothic" pitchFamily="34" charset="-128"/>
+              <a:sym typeface="Calibri" pitchFamily="34" charset="0"/>
+            </a:endParaRPr>
+          </a:p>
+        </p:txBody>
+      </p:sp>
+    </p:spTree>
+    <p:extLst>
+      <p:ext uri="{BB962C8B-B14F-4D97-AF65-F5344CB8AC3E}">
+        <p14:creationId xmlns:p14="http://schemas.microsoft.com/office/powerpoint/2010/main" val="3664120678"/>
+      </p:ext>
+    </p:extLst>
+  </p:cSld>
+  <p:clrMapOvr>
+    <a:masterClrMapping/>
+  </p:clrMapOvr>
+  <p:transition xmlns:p14="http://schemas.microsoft.com/office/powerpoint/2010/main">
+    <p:fade/>
+  </p:transition>
+  <p:timing>
+    <p:tnLst>
+      <p:par>
+        <p:cTn xmlns:p14="http://schemas.microsoft.com/office/powerpoint/2010/main" id="1" dur="indefinite" restart="never" nodeType="tmRoot"/>
       </p:par>
     </p:tnLst>
   </p:timing>
@@ -39166,7 +39621,7 @@
         </a:ln>
         <a:effectLst/>
         <a:extLst>
-          <a:ext uri="{AF507438-7753-43E0-B8FC-AC1667EBCBE1}">
+          <a:ext uri="{AF507438-7753-43e0-B8FC-AC1667EBCBE1}">
             <a14:hiddenEffects xmlns:a14="http://schemas.microsoft.com/office/drawing/2010/main">
               <a:effectLst>
                 <a:outerShdw blurRad="63500" dist="38099" dir="2700000" algn="ctr" rotWithShape="0">
@@ -39244,7 +39699,7 @@
         </a:ln>
         <a:effectLst/>
         <a:extLst>
-          <a:ext uri="{AF507438-7753-43E0-B8FC-AC1667EBCBE1}">
+          <a:ext uri="{AF507438-7753-43e0-B8FC-AC1667EBCBE1}">
             <a14:hiddenEffects xmlns:a14="http://schemas.microsoft.com/office/drawing/2010/main">
               <a:effectLst>
                 <a:outerShdw blurRad="63500" dist="38099" dir="2700000" algn="ctr" rotWithShape="0">
@@ -39586,7 +40041,7 @@
         </a:ln>
         <a:effectLst/>
         <a:extLst>
-          <a:ext uri="{AF507438-7753-43E0-B8FC-AC1667EBCBE1}">
+          <a:ext uri="{AF507438-7753-43e0-B8FC-AC1667EBCBE1}">
             <a14:hiddenEffects xmlns:a14="http://schemas.microsoft.com/office/drawing/2010/main">
               <a:effectLst>
                 <a:outerShdw blurRad="63500" dist="38099" dir="2700000" algn="ctr" rotWithShape="0">
@@ -39664,7 +40119,7 @@
         </a:ln>
         <a:effectLst/>
         <a:extLst>
-          <a:ext uri="{AF507438-7753-43E0-B8FC-AC1667EBCBE1}">
+          <a:ext uri="{AF507438-7753-43e0-B8FC-AC1667EBCBE1}">
             <a14:hiddenEffects xmlns:a14="http://schemas.microsoft.com/office/drawing/2010/main">
               <a:effectLst>
                 <a:outerShdw blurRad="63500" dist="38099" dir="2700000" algn="ctr" rotWithShape="0">
@@ -40006,7 +40461,7 @@
         </a:ln>
         <a:effectLst/>
         <a:extLst>
-          <a:ext uri="{AF507438-7753-43E0-B8FC-AC1667EBCBE1}">
+          <a:ext uri="{AF507438-7753-43e0-B8FC-AC1667EBCBE1}">
             <a14:hiddenEffects xmlns:a14="http://schemas.microsoft.com/office/drawing/2010/main">
               <a:effectLst>
                 <a:outerShdw blurRad="63500" dist="38099" dir="2700000" algn="ctr" rotWithShape="0">
@@ -40084,7 +40539,7 @@
         </a:ln>
         <a:effectLst/>
         <a:extLst>
-          <a:ext uri="{AF507438-7753-43E0-B8FC-AC1667EBCBE1}">
+          <a:ext uri="{AF507438-7753-43e0-B8FC-AC1667EBCBE1}">
             <a14:hiddenEffects xmlns:a14="http://schemas.microsoft.com/office/drawing/2010/main">
               <a:effectLst>
                 <a:outerShdw blurRad="63500" dist="38099" dir="2700000" algn="ctr" rotWithShape="0">
@@ -40426,7 +40881,7 @@
         </a:ln>
         <a:effectLst/>
         <a:extLst>
-          <a:ext uri="{AF507438-7753-43E0-B8FC-AC1667EBCBE1}">
+          <a:ext uri="{AF507438-7753-43e0-B8FC-AC1667EBCBE1}">
             <a14:hiddenEffects xmlns:a14="http://schemas.microsoft.com/office/drawing/2010/main">
               <a:effectLst>
                 <a:outerShdw blurRad="63500" dist="38099" dir="2700000" algn="ctr" rotWithShape="0">
@@ -40504,7 +40959,7 @@
         </a:ln>
         <a:effectLst/>
         <a:extLst>
-          <a:ext uri="{AF507438-7753-43E0-B8FC-AC1667EBCBE1}">
+          <a:ext uri="{AF507438-7753-43e0-B8FC-AC1667EBCBE1}">
             <a14:hiddenEffects xmlns:a14="http://schemas.microsoft.com/office/drawing/2010/main">
               <a:effectLst>
                 <a:outerShdw blurRad="63500" dist="38099" dir="2700000" algn="ctr" rotWithShape="0">
@@ -40846,7 +41301,7 @@
         </a:ln>
         <a:effectLst/>
         <a:extLst>
-          <a:ext uri="{AF507438-7753-43E0-B8FC-AC1667EBCBE1}">
+          <a:ext uri="{AF507438-7753-43e0-B8FC-AC1667EBCBE1}">
             <a14:hiddenEffects xmlns:a14="http://schemas.microsoft.com/office/drawing/2010/main">
               <a:effectLst>
                 <a:outerShdw blurRad="63500" dist="38099" dir="2700000" algn="ctr" rotWithShape="0">
@@ -40924,7 +41379,7 @@
         </a:ln>
         <a:effectLst/>
         <a:extLst>
-          <a:ext uri="{AF507438-7753-43E0-B8FC-AC1667EBCBE1}">
+          <a:ext uri="{AF507438-7753-43e0-B8FC-AC1667EBCBE1}">
             <a14:hiddenEffects xmlns:a14="http://schemas.microsoft.com/office/drawing/2010/main">
               <a:effectLst>
                 <a:outerShdw blurRad="63500" dist="38099" dir="2700000" algn="ctr" rotWithShape="0">
@@ -41266,7 +41721,7 @@
         </a:ln>
         <a:effectLst/>
         <a:extLst>
-          <a:ext uri="{AF507438-7753-43E0-B8FC-AC1667EBCBE1}">
+          <a:ext uri="{AF507438-7753-43e0-B8FC-AC1667EBCBE1}">
             <a14:hiddenEffects xmlns:a14="http://schemas.microsoft.com/office/drawing/2010/main">
               <a:effectLst>
                 <a:outerShdw blurRad="63500" dist="38099" dir="2700000" algn="ctr" rotWithShape="0">
@@ -41344,7 +41799,7 @@
         </a:ln>
         <a:effectLst/>
         <a:extLst>
-          <a:ext uri="{AF507438-7753-43E0-B8FC-AC1667EBCBE1}">
+          <a:ext uri="{AF507438-7753-43e0-B8FC-AC1667EBCBE1}">
             <a14:hiddenEffects xmlns:a14="http://schemas.microsoft.com/office/drawing/2010/main">
               <a:effectLst>
                 <a:outerShdw blurRad="63500" dist="38099" dir="2700000" algn="ctr" rotWithShape="0">
@@ -41969,7 +42424,7 @@
         </a:ln>
         <a:effectLst/>
         <a:extLst>
-          <a:ext uri="{AF507438-7753-43E0-B8FC-AC1667EBCBE1}">
+          <a:ext uri="{AF507438-7753-43e0-B8FC-AC1667EBCBE1}">
             <a14:hiddenEffects xmlns:a14="http://schemas.microsoft.com/office/drawing/2010/main">
               <a:effectLst>
                 <a:outerShdw blurRad="63500" dist="38099" dir="2700000" algn="ctr" rotWithShape="0">
@@ -42047,7 +42502,7 @@
         </a:ln>
         <a:effectLst/>
         <a:extLst>
-          <a:ext uri="{AF507438-7753-43E0-B8FC-AC1667EBCBE1}">
+          <a:ext uri="{AF507438-7753-43e0-B8FC-AC1667EBCBE1}">
             <a14:hiddenEffects xmlns:a14="http://schemas.microsoft.com/office/drawing/2010/main">
               <a:effectLst>
                 <a:outerShdw blurRad="63500" dist="38099" dir="2700000" algn="ctr" rotWithShape="0">
@@ -42389,7 +42844,7 @@
         </a:ln>
         <a:effectLst/>
         <a:extLst>
-          <a:ext uri="{AF507438-7753-43E0-B8FC-AC1667EBCBE1}">
+          <a:ext uri="{AF507438-7753-43e0-B8FC-AC1667EBCBE1}">
             <a14:hiddenEffects xmlns:a14="http://schemas.microsoft.com/office/drawing/2010/main">
               <a:effectLst>
                 <a:outerShdw blurRad="63500" dist="38099" dir="2700000" algn="ctr" rotWithShape="0">
@@ -42467,7 +42922,7 @@
         </a:ln>
         <a:effectLst/>
         <a:extLst>
-          <a:ext uri="{AF507438-7753-43E0-B8FC-AC1667EBCBE1}">
+          <a:ext uri="{AF507438-7753-43e0-B8FC-AC1667EBCBE1}">
             <a14:hiddenEffects xmlns:a14="http://schemas.microsoft.com/office/drawing/2010/main">
               <a:effectLst>
                 <a:outerShdw blurRad="63500" dist="38099" dir="2700000" algn="ctr" rotWithShape="0">
@@ -42809,7 +43264,7 @@
         </a:ln>
         <a:effectLst/>
         <a:extLst>
-          <a:ext uri="{AF507438-7753-43E0-B8FC-AC1667EBCBE1}">
+          <a:ext uri="{AF507438-7753-43e0-B8FC-AC1667EBCBE1}">
             <a14:hiddenEffects xmlns:a14="http://schemas.microsoft.com/office/drawing/2010/main">
               <a:effectLst>
                 <a:outerShdw blurRad="63500" dist="38099" dir="2700000" algn="ctr" rotWithShape="0">
@@ -42887,7 +43342,7 @@
         </a:ln>
         <a:effectLst/>
         <a:extLst>
-          <a:ext uri="{AF507438-7753-43E0-B8FC-AC1667EBCBE1}">
+          <a:ext uri="{AF507438-7753-43e0-B8FC-AC1667EBCBE1}">
             <a14:hiddenEffects xmlns:a14="http://schemas.microsoft.com/office/drawing/2010/main">
               <a:effectLst>
                 <a:outerShdw blurRad="63500" dist="38099" dir="2700000" algn="ctr" rotWithShape="0">
@@ -43229,7 +43684,7 @@
         </a:ln>
         <a:effectLst/>
         <a:extLst>
-          <a:ext uri="{AF507438-7753-43E0-B8FC-AC1667EBCBE1}">
+          <a:ext uri="{AF507438-7753-43e0-B8FC-AC1667EBCBE1}">
             <a14:hiddenEffects xmlns:a14="http://schemas.microsoft.com/office/drawing/2010/main">
               <a:effectLst>
                 <a:outerShdw blurRad="63500" dist="38099" dir="2700000" algn="ctr" rotWithShape="0">
@@ -43307,7 +43762,7 @@
         </a:ln>
         <a:effectLst/>
         <a:extLst>
-          <a:ext uri="{AF507438-7753-43E0-B8FC-AC1667EBCBE1}">
+          <a:ext uri="{AF507438-7753-43e0-B8FC-AC1667EBCBE1}">
             <a14:hiddenEffects xmlns:a14="http://schemas.microsoft.com/office/drawing/2010/main">
               <a:effectLst>
                 <a:outerShdw blurRad="63500" dist="38099" dir="2700000" algn="ctr" rotWithShape="0">
@@ -43649,7 +44104,7 @@
         </a:ln>
         <a:effectLst/>
         <a:extLst>
-          <a:ext uri="{AF507438-7753-43E0-B8FC-AC1667EBCBE1}">
+          <a:ext uri="{AF507438-7753-43e0-B8FC-AC1667EBCBE1}">
             <a14:hiddenEffects xmlns:a14="http://schemas.microsoft.com/office/drawing/2010/main">
               <a:effectLst>
                 <a:outerShdw blurRad="63500" dist="38099" dir="2700000" algn="ctr" rotWithShape="0">
@@ -43727,7 +44182,7 @@
         </a:ln>
         <a:effectLst/>
         <a:extLst>
-          <a:ext uri="{AF507438-7753-43E0-B8FC-AC1667EBCBE1}">
+          <a:ext uri="{AF507438-7753-43e0-B8FC-AC1667EBCBE1}">
             <a14:hiddenEffects xmlns:a14="http://schemas.microsoft.com/office/drawing/2010/main">
               <a:effectLst>
                 <a:outerShdw blurRad="63500" dist="38099" dir="2700000" algn="ctr" rotWithShape="0">
@@ -44069,7 +44524,7 @@
         </a:ln>
         <a:effectLst/>
         <a:extLst>
-          <a:ext uri="{AF507438-7753-43E0-B8FC-AC1667EBCBE1}">
+          <a:ext uri="{AF507438-7753-43e0-B8FC-AC1667EBCBE1}">
             <a14:hiddenEffects xmlns:a14="http://schemas.microsoft.com/office/drawing/2010/main">
               <a:effectLst>
                 <a:outerShdw blurRad="63500" dist="38099" dir="2700000" algn="ctr" rotWithShape="0">
@@ -44147,7 +44602,7 @@
         </a:ln>
         <a:effectLst/>
         <a:extLst>
-          <a:ext uri="{AF507438-7753-43E0-B8FC-AC1667EBCBE1}">
+          <a:ext uri="{AF507438-7753-43e0-B8FC-AC1667EBCBE1}">
             <a14:hiddenEffects xmlns:a14="http://schemas.microsoft.com/office/drawing/2010/main">
               <a:effectLst>
                 <a:outerShdw blurRad="63500" dist="38099" dir="2700000" algn="ctr" rotWithShape="0">
@@ -44489,7 +44944,7 @@
         </a:ln>
         <a:effectLst/>
         <a:extLst>
-          <a:ext uri="{AF507438-7753-43E0-B8FC-AC1667EBCBE1}">
+          <a:ext uri="{AF507438-7753-43e0-B8FC-AC1667EBCBE1}">
             <a14:hiddenEffects xmlns:a14="http://schemas.microsoft.com/office/drawing/2010/main">
               <a:effectLst>
                 <a:outerShdw blurRad="63500" dist="38099" dir="2700000" algn="ctr" rotWithShape="0">
@@ -44567,7 +45022,7 @@
         </a:ln>
         <a:effectLst/>
         <a:extLst>
-          <a:ext uri="{AF507438-7753-43E0-B8FC-AC1667EBCBE1}">
+          <a:ext uri="{AF507438-7753-43e0-B8FC-AC1667EBCBE1}">
             <a14:hiddenEffects xmlns:a14="http://schemas.microsoft.com/office/drawing/2010/main">
               <a:effectLst>
                 <a:outerShdw blurRad="63500" dist="38099" dir="2700000" algn="ctr" rotWithShape="0">
@@ -44909,7 +45364,7 @@
         </a:ln>
         <a:effectLst/>
         <a:extLst>
-          <a:ext uri="{AF507438-7753-43E0-B8FC-AC1667EBCBE1}">
+          <a:ext uri="{AF507438-7753-43e0-B8FC-AC1667EBCBE1}">
             <a14:hiddenEffects xmlns:a14="http://schemas.microsoft.com/office/drawing/2010/main">
               <a:effectLst>
                 <a:outerShdw blurRad="63500" dist="38099" dir="2700000" algn="ctr" rotWithShape="0">
@@ -44987,7 +45442,7 @@
         </a:ln>
         <a:effectLst/>
         <a:extLst>
-          <a:ext uri="{AF507438-7753-43E0-B8FC-AC1667EBCBE1}">
+          <a:ext uri="{AF507438-7753-43e0-B8FC-AC1667EBCBE1}">
             <a14:hiddenEffects xmlns:a14="http://schemas.microsoft.com/office/drawing/2010/main">
               <a:effectLst>
                 <a:outerShdw blurRad="63500" dist="38099" dir="2700000" algn="ctr" rotWithShape="0">
@@ -45085,6 +45540,21 @@
 </file>
 
 <file path=customXml/item1.xml><?xml version="1.0" encoding="utf-8"?>
+<?mso-contentType ?>
+<FormTemplates xmlns="http://schemas.microsoft.com/sharepoint/v3/contenttype/forms">
+  <Display>DocumentLibraryForm</Display>
+  <Edit>DocumentLibraryForm</Edit>
+  <New>DocumentLibraryForm</New>
+</FormTemplates>
+</file>
+
+<file path=customXml/item2.xml><?xml version="1.0" encoding="utf-8"?>
+<p:properties xmlns:p="http://schemas.microsoft.com/office/2006/metadata/properties" xmlns:xsi="http://www.w3.org/2001/XMLSchema-instance">
+  <documentManagement/>
+</p:properties>
+</file>
+
+<file path=customXml/item3.xml><?xml version="1.0" encoding="utf-8"?>
 <ct:contentTypeSchema xmlns:ct="http://schemas.microsoft.com/office/2006/metadata/contentType" xmlns:ma="http://schemas.microsoft.com/office/2006/metadata/properties/metaAttributes" ct:_="" ma:_="" ma:contentTypeName="Document" ma:contentTypeID="0x01010094F757A2227B254DA2F4CDE329F96858" ma:contentTypeVersion="1" ma:contentTypeDescription="Create a new document." ma:contentTypeScope="" ma:versionID="c30e744045e20684d466f77692e7e363">
   <xsd:schema xmlns:xsd="http://www.w3.org/2001/XMLSchema" xmlns:xs="http://www.w3.org/2001/XMLSchema" xmlns:p="http://schemas.microsoft.com/office/2006/metadata/properties" xmlns:ns3="fe710394-429f-4e49-bafd-e8e0605453a3" targetNamespace="http://schemas.microsoft.com/office/2006/metadata/properties" ma:root="true" ma:fieldsID="29c31838b6d385c899637e02f1842fc6" ns3:_="">
     <xsd:import namespace="fe710394-429f-4e49-bafd-e8e0605453a3"/>
@@ -45224,35 +45694,10 @@
 </ct:contentTypeSchema>
 </file>
 
-<file path=customXml/item2.xml><?xml version="1.0" encoding="utf-8"?>
-<p:properties xmlns:p="http://schemas.microsoft.com/office/2006/metadata/properties" xmlns:xsi="http://www.w3.org/2001/XMLSchema-instance">
-  <documentManagement/>
-</p:properties>
-</file>
-
-<file path=customXml/item3.xml><?xml version="1.0" encoding="utf-8"?>
-<?mso-contentType ?>
-<FormTemplates xmlns="http://schemas.microsoft.com/sharepoint/v3/contenttype/forms">
-  <Display>DocumentLibraryForm</Display>
-  <Edit>DocumentLibraryForm</Edit>
-  <New>DocumentLibraryForm</New>
-</FormTemplates>
-</file>
-
 <file path=customXml/itemProps1.xml><?xml version="1.0" encoding="utf-8"?>
-<ds:datastoreItem xmlns:ds="http://schemas.openxmlformats.org/officeDocument/2006/customXml" ds:itemID="{663F93B3-9216-41CE-A645-18766659ED1F}">
+<ds:datastoreItem xmlns:ds="http://schemas.openxmlformats.org/officeDocument/2006/customXml" ds:itemID="{0F19919B-F716-4442-A06A-E4D7C584FB83}">
   <ds:schemaRefs>
-    <ds:schemaRef ds:uri="http://schemas.microsoft.com/office/2006/metadata/contentType"/>
-    <ds:schemaRef ds:uri="http://schemas.microsoft.com/office/2006/metadata/properties/metaAttributes"/>
-    <ds:schemaRef ds:uri="http://www.w3.org/2001/XMLSchema"/>
-    <ds:schemaRef ds:uri="http://schemas.microsoft.com/office/2006/metadata/properties"/>
-    <ds:schemaRef ds:uri="fe710394-429f-4e49-bafd-e8e0605453a3"/>
-    <ds:schemaRef ds:uri="http://schemas.microsoft.com/office/2006/documentManagement/types"/>
-    <ds:schemaRef ds:uri="http://schemas.microsoft.com/office/infopath/2007/PartnerControls"/>
-    <ds:schemaRef ds:uri="http://schemas.openxmlformats.org/package/2006/metadata/core-properties"/>
-    <ds:schemaRef ds:uri="http://purl.org/dc/elements/1.1/"/>
-    <ds:schemaRef ds:uri="http://purl.org/dc/terms/"/>
-    <ds:schemaRef ds:uri="http://schemas.microsoft.com/internal/obd"/>
+    <ds:schemaRef ds:uri="http://schemas.microsoft.com/sharepoint/v3/contenttype/forms"/>
   </ds:schemaRefs>
 </ds:datastoreItem>
 </file>
@@ -45274,9 +45719,19 @@
 </file>
 
 <file path=customXml/itemProps3.xml><?xml version="1.0" encoding="utf-8"?>
-<ds:datastoreItem xmlns:ds="http://schemas.openxmlformats.org/officeDocument/2006/customXml" ds:itemID="{0F19919B-F716-4442-A06A-E4D7C584FB83}">
+<ds:datastoreItem xmlns:ds="http://schemas.openxmlformats.org/officeDocument/2006/customXml" ds:itemID="{663F93B3-9216-41CE-A645-18766659ED1F}">
   <ds:schemaRefs>
-    <ds:schemaRef ds:uri="http://schemas.microsoft.com/sharepoint/v3/contenttype/forms"/>
+    <ds:schemaRef ds:uri="http://schemas.microsoft.com/office/2006/metadata/contentType"/>
+    <ds:schemaRef ds:uri="http://schemas.microsoft.com/office/2006/metadata/properties/metaAttributes"/>
+    <ds:schemaRef ds:uri="http://www.w3.org/2001/XMLSchema"/>
+    <ds:schemaRef ds:uri="http://schemas.microsoft.com/office/2006/metadata/properties"/>
+    <ds:schemaRef ds:uri="fe710394-429f-4e49-bafd-e8e0605453a3"/>
+    <ds:schemaRef ds:uri="http://schemas.microsoft.com/office/2006/documentManagement/types"/>
+    <ds:schemaRef ds:uri="http://schemas.microsoft.com/office/infopath/2007/PartnerControls"/>
+    <ds:schemaRef ds:uri="http://schemas.openxmlformats.org/package/2006/metadata/core-properties"/>
+    <ds:schemaRef ds:uri="http://purl.org/dc/elements/1.1/"/>
+    <ds:schemaRef ds:uri="http://purl.org/dc/terms/"/>
+    <ds:schemaRef ds:uri="http://schemas.microsoft.com/internal/obd"/>
   </ds:schemaRefs>
 </ds:datastoreItem>
 </file>
</xml_diff>